<commit_message>
FY23Q2 refresh - msteams-teamwork-endpoint
- run through all exercise steps in associated MSLearn module to validate good working order
- updated steps & fixed typos where necessary
- updated slides where necessary
- update code samples to reflect MSLearn HOL exercise refresh & updates
- any & all users/names/company names/pictures/IDs are not real people/tenants... all are from M365 demo tenants provided by Microsoft
</commit_message>
<xml_diff>
--- a/Teams/70 Microsoft Graph Teamwork Endpoint/slides.pptx
+++ b/Teams/70 Microsoft Graph Teamwork Endpoint/slides.pptx
@@ -5966,7 +5966,7 @@
           <a:p>
             <a:fld id="{F5D67128-0ED3-F84C-AB75-26956BD6F773}" type="datetimeFigureOut">
               <a:rPr lang="en-US" smtClean="0"/>
-              <a:t>5/26/21</a:t>
+              <a:t>12/4/22</a:t>
             </a:fld>
             <a:endParaRPr lang="en-US"/>
           </a:p>
@@ -6143,7 +6143,7 @@
           <a:p>
             <a:fld id="{9E65F564-29A8-0243-B41B-CCCF740F82F1}" type="datetimeFigureOut">
               <a:rPr lang="en-US" smtClean="0"/>
-              <a:t>5/26/21</a:t>
+              <a:t>12/4/22</a:t>
             </a:fld>
             <a:endParaRPr lang="en-US"/>
           </a:p>
@@ -13464,6 +13464,9 @@
             </a:pPr>
             <a:r>
               <a:rPr lang="en-US" dirty="0">
+                <a:solidFill>
+                  <a:srgbClr val="3F115C"/>
+                </a:solidFill>
                 <a:latin typeface="Courier New" panose="02070309020205020404" pitchFamily="49" charset="0"/>
                 <a:cs typeface="Courier New" panose="02070309020205020404" pitchFamily="49" charset="0"/>
               </a:rPr>
@@ -13471,6 +13474,9 @@
             </a:r>
             <a:r>
               <a:rPr lang="en-US" dirty="0" err="1">
+                <a:solidFill>
+                  <a:srgbClr val="3F115C"/>
+                </a:solidFill>
                 <a:latin typeface="Courier New" panose="02070309020205020404" pitchFamily="49" charset="0"/>
                 <a:cs typeface="Courier New" panose="02070309020205020404" pitchFamily="49" charset="0"/>
               </a:rPr>
@@ -13478,6 +13484,9 @@
             </a:r>
             <a:r>
               <a:rPr lang="en-US" dirty="0">
+                <a:solidFill>
+                  <a:srgbClr val="3F115C"/>
+                </a:solidFill>
                 <a:latin typeface="Courier New" panose="02070309020205020404" pitchFamily="49" charset="0"/>
                 <a:cs typeface="Courier New" panose="02070309020205020404" pitchFamily="49" charset="0"/>
               </a:rPr>
@@ -13485,6 +13494,9 @@
             </a:r>
             <a:r>
               <a:rPr lang="en-US" dirty="0" err="1">
+                <a:solidFill>
+                  <a:srgbClr val="3F115C"/>
+                </a:solidFill>
                 <a:latin typeface="Courier New" panose="02070309020205020404" pitchFamily="49" charset="0"/>
                 <a:cs typeface="Courier New" panose="02070309020205020404" pitchFamily="49" charset="0"/>
               </a:rPr>
@@ -13492,6 +13504,9 @@
             </a:r>
             <a:r>
               <a:rPr lang="en-US" dirty="0">
+                <a:solidFill>
+                  <a:srgbClr val="3F115C"/>
+                </a:solidFill>
                 <a:latin typeface="Courier New" panose="02070309020205020404" pitchFamily="49" charset="0"/>
                 <a:cs typeface="Courier New" panose="02070309020205020404" pitchFamily="49" charset="0"/>
               </a:rPr>
@@ -13499,6 +13514,9 @@
             </a:r>
             <a:r>
               <a:rPr lang="en-US" dirty="0" err="1">
+                <a:solidFill>
+                  <a:srgbClr val="3F115C"/>
+                </a:solidFill>
                 <a:latin typeface="Courier New" panose="02070309020205020404" pitchFamily="49" charset="0"/>
                 <a:cs typeface="Courier New" panose="02070309020205020404" pitchFamily="49" charset="0"/>
               </a:rPr>
@@ -13506,6 +13524,9 @@
             </a:r>
             <a:r>
               <a:rPr lang="en-US" dirty="0">
+                <a:solidFill>
+                  <a:srgbClr val="3F115C"/>
+                </a:solidFill>
                 <a:latin typeface="Courier New" panose="02070309020205020404" pitchFamily="49" charset="0"/>
                 <a:cs typeface="Courier New" panose="02070309020205020404" pitchFamily="49" charset="0"/>
               </a:rPr>
@@ -13518,6 +13539,9 @@
             </a:pPr>
             <a:r>
               <a:rPr lang="en-US" dirty="0">
+                <a:solidFill>
+                  <a:srgbClr val="3F115C"/>
+                </a:solidFill>
                 <a:latin typeface="Courier New" panose="02070309020205020404" pitchFamily="49" charset="0"/>
                 <a:cs typeface="Courier New" panose="02070309020205020404" pitchFamily="49" charset="0"/>
               </a:rPr>
@@ -13530,6 +13554,9 @@
             </a:pPr>
             <a:r>
               <a:rPr lang="en-US" dirty="0">
+                <a:solidFill>
+                  <a:srgbClr val="3F115C"/>
+                </a:solidFill>
                 <a:latin typeface="Courier New" panose="02070309020205020404" pitchFamily="49" charset="0"/>
                 <a:cs typeface="Courier New" panose="02070309020205020404" pitchFamily="49" charset="0"/>
               </a:rPr>
@@ -13542,6 +13569,9 @@
             </a:pPr>
             <a:r>
               <a:rPr lang="en-US" dirty="0">
+                <a:solidFill>
+                  <a:srgbClr val="3F115C"/>
+                </a:solidFill>
                 <a:latin typeface="Courier New" panose="02070309020205020404" pitchFamily="49" charset="0"/>
                 <a:cs typeface="Courier New" panose="02070309020205020404" pitchFamily="49" charset="0"/>
               </a:rPr>
@@ -13549,6 +13579,9 @@
             </a:r>
             <a:r>
               <a:rPr lang="en-US" dirty="0" err="1">
+                <a:solidFill>
+                  <a:srgbClr val="3F115C"/>
+                </a:solidFill>
                 <a:latin typeface="Courier New" panose="02070309020205020404" pitchFamily="49" charset="0"/>
                 <a:cs typeface="Courier New" panose="02070309020205020404" pitchFamily="49" charset="0"/>
               </a:rPr>
@@ -13556,6 +13589,9 @@
             </a:r>
             <a:r>
               <a:rPr lang="en-US" dirty="0">
+                <a:solidFill>
+                  <a:srgbClr val="3F115C"/>
+                </a:solidFill>
                 <a:latin typeface="Courier New" panose="02070309020205020404" pitchFamily="49" charset="0"/>
                 <a:cs typeface="Courier New" panose="02070309020205020404" pitchFamily="49" charset="0"/>
               </a:rPr>
@@ -13568,6 +13604,9 @@
             </a:pPr>
             <a:r>
               <a:rPr lang="en-US" dirty="0">
+                <a:solidFill>
+                  <a:srgbClr val="3F115C"/>
+                </a:solidFill>
                 <a:latin typeface="Courier New" panose="02070309020205020404" pitchFamily="49" charset="0"/>
                 <a:cs typeface="Courier New" panose="02070309020205020404" pitchFamily="49" charset="0"/>
               </a:rPr>
@@ -13575,6 +13614,9 @@
             </a:r>
             <a:r>
               <a:rPr lang="en-US" dirty="0" err="1">
+                <a:solidFill>
+                  <a:srgbClr val="3F115C"/>
+                </a:solidFill>
                 <a:latin typeface="Courier New" panose="02070309020205020404" pitchFamily="49" charset="0"/>
                 <a:cs typeface="Courier New" panose="02070309020205020404" pitchFamily="49" charset="0"/>
               </a:rPr>
@@ -13582,6 +13624,9 @@
             </a:r>
             <a:r>
               <a:rPr lang="en-US" dirty="0">
+                <a:solidFill>
+                  <a:srgbClr val="3F115C"/>
+                </a:solidFill>
                 <a:latin typeface="Courier New" panose="02070309020205020404" pitchFamily="49" charset="0"/>
                 <a:cs typeface="Courier New" panose="02070309020205020404" pitchFamily="49" charset="0"/>
               </a:rPr>
@@ -13589,12 +13634,18 @@
             </a:r>
             <a:br>
               <a:rPr lang="en-US" dirty="0">
+                <a:solidFill>
+                  <a:srgbClr val="3F115C"/>
+                </a:solidFill>
                 <a:latin typeface="Courier New" panose="02070309020205020404" pitchFamily="49" charset="0"/>
                 <a:cs typeface="Courier New" panose="02070309020205020404" pitchFamily="49" charset="0"/>
               </a:rPr>
             </a:br>
             <a:r>
               <a:rPr lang="en-US" dirty="0">
+                <a:solidFill>
+                  <a:srgbClr val="3F115C"/>
+                </a:solidFill>
                 <a:latin typeface="Courier New" panose="02070309020205020404" pitchFamily="49" charset="0"/>
                 <a:cs typeface="Courier New" panose="02070309020205020404" pitchFamily="49" charset="0"/>
               </a:rPr>
@@ -13602,6 +13653,9 @@
             </a:r>
             <a:r>
               <a:rPr lang="en-US" dirty="0" err="1">
+                <a:solidFill>
+                  <a:srgbClr val="3F115C"/>
+                </a:solidFill>
                 <a:latin typeface="Courier New" panose="02070309020205020404" pitchFamily="49" charset="0"/>
                 <a:cs typeface="Courier New" panose="02070309020205020404" pitchFamily="49" charset="0"/>
               </a:rPr>
@@ -13609,6 +13663,9 @@
             </a:r>
             <a:r>
               <a:rPr lang="en-US" dirty="0">
+                <a:solidFill>
+                  <a:srgbClr val="3F115C"/>
+                </a:solidFill>
                 <a:latin typeface="Courier New" panose="02070309020205020404" pitchFamily="49" charset="0"/>
                 <a:cs typeface="Courier New" panose="02070309020205020404" pitchFamily="49" charset="0"/>
               </a:rPr>
@@ -13616,6 +13673,9 @@
             </a:r>
             <a:r>
               <a:rPr lang="en-US" dirty="0" err="1">
+                <a:solidFill>
+                  <a:srgbClr val="3F115C"/>
+                </a:solidFill>
                 <a:latin typeface="Courier New" panose="02070309020205020404" pitchFamily="49" charset="0"/>
                 <a:cs typeface="Courier New" panose="02070309020205020404" pitchFamily="49" charset="0"/>
               </a:rPr>
@@ -13623,6 +13683,9 @@
             </a:r>
             <a:r>
               <a:rPr lang="en-US" dirty="0">
+                <a:solidFill>
+                  <a:srgbClr val="3F115C"/>
+                </a:solidFill>
                 <a:latin typeface="Courier New" panose="02070309020205020404" pitchFamily="49" charset="0"/>
                 <a:cs typeface="Courier New" panose="02070309020205020404" pitchFamily="49" charset="0"/>
               </a:rPr>
@@ -13630,6 +13693,9 @@
             </a:r>
             <a:r>
               <a:rPr lang="en-US" dirty="0" err="1">
+                <a:solidFill>
+                  <a:srgbClr val="3F115C"/>
+                </a:solidFill>
                 <a:latin typeface="Courier New" panose="02070309020205020404" pitchFamily="49" charset="0"/>
                 <a:cs typeface="Courier New" panose="02070309020205020404" pitchFamily="49" charset="0"/>
               </a:rPr>
@@ -13637,6 +13703,9 @@
             </a:r>
             <a:r>
               <a:rPr lang="en-US" dirty="0">
+                <a:solidFill>
+                  <a:srgbClr val="3F115C"/>
+                </a:solidFill>
                 <a:latin typeface="Courier New" panose="02070309020205020404" pitchFamily="49" charset="0"/>
                 <a:cs typeface="Courier New" panose="02070309020205020404" pitchFamily="49" charset="0"/>
               </a:rPr>
@@ -13644,6 +13713,9 @@
             </a:r>
             <a:r>
               <a:rPr lang="en-US" dirty="0" err="1">
+                <a:solidFill>
+                  <a:srgbClr val="3F115C"/>
+                </a:solidFill>
                 <a:latin typeface="Courier New" panose="02070309020205020404" pitchFamily="49" charset="0"/>
                 <a:cs typeface="Courier New" panose="02070309020205020404" pitchFamily="49" charset="0"/>
               </a:rPr>
@@ -13651,6 +13723,9 @@
             </a:r>
             <a:r>
               <a:rPr lang="en-US" dirty="0">
+                <a:solidFill>
+                  <a:srgbClr val="3F115C"/>
+                </a:solidFill>
                 <a:latin typeface="Courier New" panose="02070309020205020404" pitchFamily="49" charset="0"/>
                 <a:cs typeface="Courier New" panose="02070309020205020404" pitchFamily="49" charset="0"/>
               </a:rPr>
@@ -13663,6 +13738,9 @@
             </a:pPr>
             <a:r>
               <a:rPr lang="en-US" dirty="0">
+                <a:solidFill>
+                  <a:srgbClr val="3F115C"/>
+                </a:solidFill>
                 <a:latin typeface="Courier New" panose="02070309020205020404" pitchFamily="49" charset="0"/>
                 <a:cs typeface="Courier New" panose="02070309020205020404" pitchFamily="49" charset="0"/>
               </a:rPr>
@@ -13675,6 +13753,9 @@
             </a:pPr>
             <a:r>
               <a:rPr lang="en-US" dirty="0">
+                <a:solidFill>
+                  <a:srgbClr val="3F115C"/>
+                </a:solidFill>
                 <a:latin typeface="Courier New" panose="02070309020205020404" pitchFamily="49" charset="0"/>
                 <a:cs typeface="Courier New" panose="02070309020205020404" pitchFamily="49" charset="0"/>
               </a:rPr>
@@ -13682,6 +13763,9 @@
             </a:r>
             <a:r>
               <a:rPr lang="en-US" dirty="0" err="1">
+                <a:solidFill>
+                  <a:srgbClr val="3F115C"/>
+                </a:solidFill>
                 <a:latin typeface="Courier New" panose="02070309020205020404" pitchFamily="49" charset="0"/>
                 <a:cs typeface="Courier New" panose="02070309020205020404" pitchFamily="49" charset="0"/>
               </a:rPr>
@@ -13689,6 +13773,9 @@
             </a:r>
             <a:r>
               <a:rPr lang="en-US" dirty="0">
+                <a:solidFill>
+                  <a:srgbClr val="3F115C"/>
+                </a:solidFill>
                 <a:latin typeface="Courier New" panose="02070309020205020404" pitchFamily="49" charset="0"/>
                 <a:cs typeface="Courier New" panose="02070309020205020404" pitchFamily="49" charset="0"/>
               </a:rPr>
@@ -13701,6 +13788,9 @@
             </a:pPr>
             <a:r>
               <a:rPr lang="en-US" dirty="0">
+                <a:solidFill>
+                  <a:srgbClr val="3F115C"/>
+                </a:solidFill>
                 <a:latin typeface="Courier New" panose="02070309020205020404" pitchFamily="49" charset="0"/>
                 <a:cs typeface="Courier New" panose="02070309020205020404" pitchFamily="49" charset="0"/>
               </a:rPr>
@@ -13708,6 +13798,9 @@
             </a:r>
             <a:r>
               <a:rPr lang="en-US" dirty="0" err="1">
+                <a:solidFill>
+                  <a:srgbClr val="3F115C"/>
+                </a:solidFill>
                 <a:latin typeface="Courier New" panose="02070309020205020404" pitchFamily="49" charset="0"/>
                 <a:cs typeface="Courier New" panose="02070309020205020404" pitchFamily="49" charset="0"/>
               </a:rPr>
@@ -13715,6 +13808,9 @@
             </a:r>
             <a:r>
               <a:rPr lang="en-US" dirty="0">
+                <a:solidFill>
+                  <a:srgbClr val="3F115C"/>
+                </a:solidFill>
                 <a:latin typeface="Courier New" panose="02070309020205020404" pitchFamily="49" charset="0"/>
                 <a:cs typeface="Courier New" panose="02070309020205020404" pitchFamily="49" charset="0"/>
               </a:rPr>
@@ -13722,6 +13818,9 @@
             </a:r>
             <a:r>
               <a:rPr lang="en-US" dirty="0" err="1">
+                <a:solidFill>
+                  <a:srgbClr val="3F115C"/>
+                </a:solidFill>
                 <a:latin typeface="Courier New" panose="02070309020205020404" pitchFamily="49" charset="0"/>
                 <a:cs typeface="Courier New" panose="02070309020205020404" pitchFamily="49" charset="0"/>
               </a:rPr>
@@ -13729,6 +13828,9 @@
             </a:r>
             <a:r>
               <a:rPr lang="en-US" dirty="0">
+                <a:solidFill>
+                  <a:srgbClr val="3F115C"/>
+                </a:solidFill>
                 <a:latin typeface="Courier New" panose="02070309020205020404" pitchFamily="49" charset="0"/>
                 <a:cs typeface="Courier New" panose="02070309020205020404" pitchFamily="49" charset="0"/>
               </a:rPr>
@@ -13736,6 +13838,9 @@
             </a:r>
             <a:r>
               <a:rPr lang="en-US" dirty="0" err="1">
+                <a:solidFill>
+                  <a:srgbClr val="3F115C"/>
+                </a:solidFill>
                 <a:latin typeface="Courier New" panose="02070309020205020404" pitchFamily="49" charset="0"/>
                 <a:cs typeface="Courier New" panose="02070309020205020404" pitchFamily="49" charset="0"/>
               </a:rPr>
@@ -13743,6 +13848,9 @@
             </a:r>
             <a:r>
               <a:rPr lang="en-US" dirty="0">
+                <a:solidFill>
+                  <a:srgbClr val="3F115C"/>
+                </a:solidFill>
                 <a:latin typeface="Courier New" panose="02070309020205020404" pitchFamily="49" charset="0"/>
                 <a:cs typeface="Courier New" panose="02070309020205020404" pitchFamily="49" charset="0"/>
               </a:rPr>
@@ -13750,6 +13858,9 @@
             </a:r>
             <a:r>
               <a:rPr lang="en-US" dirty="0" err="1">
+                <a:solidFill>
+                  <a:srgbClr val="3F115C"/>
+                </a:solidFill>
                 <a:latin typeface="Courier New" panose="02070309020205020404" pitchFamily="49" charset="0"/>
                 <a:cs typeface="Courier New" panose="02070309020205020404" pitchFamily="49" charset="0"/>
               </a:rPr>
@@ -13757,6 +13868,9 @@
             </a:r>
             <a:r>
               <a:rPr lang="en-US" dirty="0">
+                <a:solidFill>
+                  <a:srgbClr val="3F115C"/>
+                </a:solidFill>
                 <a:latin typeface="Courier New" panose="02070309020205020404" pitchFamily="49" charset="0"/>
                 <a:cs typeface="Courier New" panose="02070309020205020404" pitchFamily="49" charset="0"/>
               </a:rPr>
@@ -13769,6 +13883,9 @@
             </a:pPr>
             <a:r>
               <a:rPr lang="en-US" dirty="0">
+                <a:solidFill>
+                  <a:srgbClr val="3F115C"/>
+                </a:solidFill>
                 <a:latin typeface="Courier New" panose="02070309020205020404" pitchFamily="49" charset="0"/>
                 <a:cs typeface="Courier New" panose="02070309020205020404" pitchFamily="49" charset="0"/>
               </a:rPr>
@@ -13776,6 +13893,9 @@
             </a:r>
             <a:r>
               <a:rPr lang="en-US" dirty="0" err="1">
+                <a:solidFill>
+                  <a:srgbClr val="3F115C"/>
+                </a:solidFill>
                 <a:latin typeface="Courier New" panose="02070309020205020404" pitchFamily="49" charset="0"/>
                 <a:cs typeface="Courier New" panose="02070309020205020404" pitchFamily="49" charset="0"/>
               </a:rPr>
@@ -13783,6 +13903,9 @@
             </a:r>
             <a:r>
               <a:rPr lang="en-US" dirty="0">
+                <a:solidFill>
+                  <a:srgbClr val="3F115C"/>
+                </a:solidFill>
                 <a:latin typeface="Courier New" panose="02070309020205020404" pitchFamily="49" charset="0"/>
                 <a:cs typeface="Courier New" panose="02070309020205020404" pitchFamily="49" charset="0"/>
               </a:rPr>
@@ -13795,6 +13918,9 @@
             </a:pPr>
             <a:r>
               <a:rPr lang="en-US" dirty="0">
+                <a:solidFill>
+                  <a:srgbClr val="3F115C"/>
+                </a:solidFill>
                 <a:latin typeface="Courier New" panose="02070309020205020404" pitchFamily="49" charset="0"/>
                 <a:cs typeface="Courier New" panose="02070309020205020404" pitchFamily="49" charset="0"/>
               </a:rPr>
@@ -13802,6 +13928,9 @@
             </a:r>
             <a:r>
               <a:rPr lang="en-US" dirty="0" err="1">
+                <a:solidFill>
+                  <a:srgbClr val="3F115C"/>
+                </a:solidFill>
                 <a:latin typeface="Courier New" panose="02070309020205020404" pitchFamily="49" charset="0"/>
                 <a:cs typeface="Courier New" panose="02070309020205020404" pitchFamily="49" charset="0"/>
               </a:rPr>
@@ -13809,6 +13938,9 @@
             </a:r>
             <a:r>
               <a:rPr lang="en-US" dirty="0">
+                <a:solidFill>
+                  <a:srgbClr val="3F115C"/>
+                </a:solidFill>
                 <a:latin typeface="Courier New" panose="02070309020205020404" pitchFamily="49" charset="0"/>
                 <a:cs typeface="Courier New" panose="02070309020205020404" pitchFamily="49" charset="0"/>
               </a:rPr>
@@ -13821,6 +13953,9 @@
             </a:pPr>
             <a:r>
               <a:rPr lang="en-US" dirty="0">
+                <a:solidFill>
+                  <a:srgbClr val="3F115C"/>
+                </a:solidFill>
                 <a:latin typeface="Courier New" panose="02070309020205020404" pitchFamily="49" charset="0"/>
                 <a:cs typeface="Courier New" panose="02070309020205020404" pitchFamily="49" charset="0"/>
               </a:rPr>
@@ -13833,6 +13968,9 @@
             </a:pPr>
             <a:r>
               <a:rPr lang="en-US" dirty="0">
+                <a:solidFill>
+                  <a:srgbClr val="3F115C"/>
+                </a:solidFill>
                 <a:latin typeface="Courier New" panose="02070309020205020404" pitchFamily="49" charset="0"/>
                 <a:cs typeface="Courier New" panose="02070309020205020404" pitchFamily="49" charset="0"/>
               </a:rPr>
@@ -13840,7 +13978,11 @@
             </a:r>
           </a:p>
           <a:p>
-            <a:endParaRPr lang="en-US" dirty="0"/>
+            <a:endParaRPr lang="en-US" dirty="0">
+              <a:solidFill>
+                <a:srgbClr val="3F115C"/>
+              </a:solidFill>
+            </a:endParaRPr>
           </a:p>
         </p:txBody>
       </p:sp>
@@ -18026,14 +18168,14 @@
         <p:spPr/>
         <p:txBody>
           <a:bodyPr>
-            <a:normAutofit fontScale="47500" lnSpcReduction="20000"/>
+            <a:normAutofit/>
           </a:bodyPr>
           <a:lstStyle/>
           <a:p>
             <a:r>
-              <a:rPr lang="en-US" b="1" dirty="0">
+              <a:rPr lang="en-US" sz="1200" b="1" dirty="0">
                 <a:solidFill>
-                  <a:schemeClr val="accent1"/>
+                  <a:srgbClr val="3F115C"/>
                 </a:solidFill>
                 <a:latin typeface="Courier New" panose="02070309020205020404" pitchFamily="49" charset="0"/>
                 <a:cs typeface="Courier New" panose="02070309020205020404" pitchFamily="49" charset="0"/>
@@ -18041,9 +18183,9 @@
               <a:t>HTTP POST https://</a:t>
             </a:r>
             <a:r>
-              <a:rPr lang="en-US" b="1" dirty="0" err="1">
+              <a:rPr lang="en-US" sz="1200" b="1" dirty="0" err="1">
                 <a:solidFill>
-                  <a:schemeClr val="accent1"/>
+                  <a:srgbClr val="3F115C"/>
                 </a:solidFill>
                 <a:latin typeface="Courier New" panose="02070309020205020404" pitchFamily="49" charset="0"/>
                 <a:cs typeface="Courier New" panose="02070309020205020404" pitchFamily="49" charset="0"/>
@@ -18051,9 +18193,9 @@
               <a:t>graph.microsoft.com</a:t>
             </a:r>
             <a:r>
-              <a:rPr lang="en-US" b="1" dirty="0">
+              <a:rPr lang="en-US" sz="1200" b="1" dirty="0">
                 <a:solidFill>
-                  <a:schemeClr val="accent1"/>
+                  <a:srgbClr val="3F115C"/>
                 </a:solidFill>
                 <a:latin typeface="Courier New" panose="02070309020205020404" pitchFamily="49" charset="0"/>
                 <a:cs typeface="Courier New" panose="02070309020205020404" pitchFamily="49" charset="0"/>
@@ -18061,9 +18203,9 @@
               <a:t>/v1.0/teams/{</a:t>
             </a:r>
             <a:r>
-              <a:rPr lang="en-US" b="1" dirty="0" err="1">
+              <a:rPr lang="en-US" sz="1200" b="1" dirty="0" err="1">
                 <a:solidFill>
-                  <a:schemeClr val="accent1"/>
+                  <a:srgbClr val="3F115C"/>
                 </a:solidFill>
                 <a:latin typeface="Courier New" panose="02070309020205020404" pitchFamily="49" charset="0"/>
                 <a:cs typeface="Courier New" panose="02070309020205020404" pitchFamily="49" charset="0"/>
@@ -18071,9 +18213,9 @@
               <a:t>groupId</a:t>
             </a:r>
             <a:r>
-              <a:rPr lang="en-US" b="1" dirty="0">
+              <a:rPr lang="en-US" sz="1200" b="1" dirty="0">
                 <a:solidFill>
-                  <a:schemeClr val="accent1"/>
+                  <a:srgbClr val="3F115C"/>
                 </a:solidFill>
                 <a:latin typeface="Courier New" panose="02070309020205020404" pitchFamily="49" charset="0"/>
                 <a:cs typeface="Courier New" panose="02070309020205020404" pitchFamily="49" charset="0"/>
@@ -18081,32 +18223,38 @@
               <a:t>}/</a:t>
             </a:r>
             <a:r>
-              <a:rPr lang="en-US" b="1" dirty="0" err="1">
+              <a:rPr lang="en-US" sz="1200" b="1" dirty="0" err="1">
                 <a:solidFill>
-                  <a:schemeClr val="accent1"/>
+                  <a:srgbClr val="3F115C"/>
                 </a:solidFill>
                 <a:latin typeface="Courier New" panose="02070309020205020404" pitchFamily="49" charset="0"/>
                 <a:cs typeface="Courier New" panose="02070309020205020404" pitchFamily="49" charset="0"/>
               </a:rPr>
               <a:t>sendActivityNotification</a:t>
             </a:r>
-            <a:endParaRPr lang="en-US" b="1" dirty="0">
+            <a:endParaRPr lang="en-US" sz="1200" b="1" dirty="0">
               <a:solidFill>
-                <a:schemeClr val="accent1"/>
+                <a:srgbClr val="3F115C"/>
               </a:solidFill>
               <a:latin typeface="Courier New" panose="02070309020205020404" pitchFamily="49" charset="0"/>
               <a:cs typeface="Courier New" panose="02070309020205020404" pitchFamily="49" charset="0"/>
             </a:endParaRPr>
           </a:p>
           <a:p>
-            <a:endParaRPr lang="en-US" dirty="0">
+            <a:endParaRPr lang="en-US" sz="1200" dirty="0">
+              <a:solidFill>
+                <a:srgbClr val="3F115C"/>
+              </a:solidFill>
               <a:latin typeface="Courier New" panose="02070309020205020404" pitchFamily="49" charset="0"/>
               <a:cs typeface="Courier New" panose="02070309020205020404" pitchFamily="49" charset="0"/>
             </a:endParaRPr>
           </a:p>
           <a:p>
             <a:r>
-              <a:rPr lang="en-US" dirty="0">
+              <a:rPr lang="en-US" sz="1200" dirty="0">
+                <a:solidFill>
+                  <a:srgbClr val="3F115C"/>
+                </a:solidFill>
                 <a:latin typeface="Courier New" panose="02070309020205020404" pitchFamily="49" charset="0"/>
                 <a:cs typeface="Courier New" panose="02070309020205020404" pitchFamily="49" charset="0"/>
               </a:rPr>
@@ -18115,30 +18263,122 @@
           </a:p>
           <a:p>
             <a:r>
-              <a:rPr lang="en-US" dirty="0">
-                <a:latin typeface="Courier New" panose="02070309020205020404" pitchFamily="49" charset="0"/>
-                <a:cs typeface="Courier New" panose="02070309020205020404" pitchFamily="49" charset="0"/>
-              </a:rPr>
-              <a:t>  "topic": {</a:t>
-            </a:r>
-          </a:p>
-          <a:p>
-            <a:r>
-              <a:rPr lang="en-US" dirty="0">
-                <a:latin typeface="Courier New" panose="02070309020205020404" pitchFamily="49" charset="0"/>
-                <a:cs typeface="Courier New" panose="02070309020205020404" pitchFamily="49" charset="0"/>
-              </a:rPr>
-              <a:t>    "source": "</a:t>
-            </a:r>
-            <a:r>
-              <a:rPr lang="en-US" dirty="0" err="1">
+              <a:rPr lang="en-US" sz="1200" dirty="0">
+                <a:solidFill>
+                  <a:srgbClr val="3F115C"/>
+                </a:solidFill>
+                <a:latin typeface="Courier New" panose="02070309020205020404" pitchFamily="49" charset="0"/>
+                <a:cs typeface="Courier New" panose="02070309020205020404" pitchFamily="49" charset="0"/>
+              </a:rPr>
+              <a:t>  "topic": { "source": "</a:t>
+            </a:r>
+            <a:r>
+              <a:rPr lang="en-US" sz="1200" dirty="0" err="1">
+                <a:solidFill>
+                  <a:srgbClr val="3F115C"/>
+                </a:solidFill>
                 <a:latin typeface="Courier New" panose="02070309020205020404" pitchFamily="49" charset="0"/>
                 <a:cs typeface="Courier New" panose="02070309020205020404" pitchFamily="49" charset="0"/>
               </a:rPr>
               <a:t>entityUrl</a:t>
             </a:r>
             <a:r>
-              <a:rPr lang="en-US" dirty="0">
+              <a:rPr lang="en-US" sz="1200" dirty="0">
+                <a:solidFill>
+                  <a:srgbClr val="3F115C"/>
+                </a:solidFill>
+                <a:latin typeface="Courier New" panose="02070309020205020404" pitchFamily="49" charset="0"/>
+                <a:cs typeface="Courier New" panose="02070309020205020404" pitchFamily="49" charset="0"/>
+              </a:rPr>
+              <a:t>", "value": `https://</a:t>
+            </a:r>
+            <a:r>
+              <a:rPr lang="en-US" sz="1200" dirty="0" err="1">
+                <a:solidFill>
+                  <a:srgbClr val="3F115C"/>
+                </a:solidFill>
+                <a:latin typeface="Courier New" panose="02070309020205020404" pitchFamily="49" charset="0"/>
+                <a:cs typeface="Courier New" panose="02070309020205020404" pitchFamily="49" charset="0"/>
+              </a:rPr>
+              <a:t>graph.microsoft.com</a:t>
+            </a:r>
+            <a:r>
+              <a:rPr lang="en-US" sz="1200" dirty="0">
+                <a:solidFill>
+                  <a:srgbClr val="3F115C"/>
+                </a:solidFill>
+                <a:latin typeface="Courier New" panose="02070309020205020404" pitchFamily="49" charset="0"/>
+                <a:cs typeface="Courier New" panose="02070309020205020404" pitchFamily="49" charset="0"/>
+              </a:rPr>
+              <a:t>/beta/teams/{</a:t>
+            </a:r>
+            <a:r>
+              <a:rPr lang="en-US" sz="1200" dirty="0" err="1">
+                <a:solidFill>
+                  <a:srgbClr val="3F115C"/>
+                </a:solidFill>
+                <a:latin typeface="Courier New" panose="02070309020205020404" pitchFamily="49" charset="0"/>
+                <a:cs typeface="Courier New" panose="02070309020205020404" pitchFamily="49" charset="0"/>
+              </a:rPr>
+              <a:t>groupId</a:t>
+            </a:r>
+            <a:r>
+              <a:rPr lang="en-US" sz="1200" dirty="0">
+                <a:solidFill>
+                  <a:srgbClr val="3F115C"/>
+                </a:solidFill>
+                <a:latin typeface="Courier New" panose="02070309020205020404" pitchFamily="49" charset="0"/>
+                <a:cs typeface="Courier New" panose="02070309020205020404" pitchFamily="49" charset="0"/>
+              </a:rPr>
+              <a:t>}` },</a:t>
+            </a:r>
+          </a:p>
+          <a:p>
+            <a:r>
+              <a:rPr lang="en-US" sz="1200" dirty="0">
+                <a:solidFill>
+                  <a:srgbClr val="3F115C"/>
+                </a:solidFill>
+                <a:latin typeface="Courier New" panose="02070309020205020404" pitchFamily="49" charset="0"/>
+                <a:cs typeface="Courier New" panose="02070309020205020404" pitchFamily="49" charset="0"/>
+              </a:rPr>
+              <a:t>  "</a:t>
+            </a:r>
+            <a:r>
+              <a:rPr lang="en-US" sz="1200" dirty="0" err="1">
+                <a:solidFill>
+                  <a:srgbClr val="3F115C"/>
+                </a:solidFill>
+                <a:latin typeface="Courier New" panose="02070309020205020404" pitchFamily="49" charset="0"/>
+                <a:cs typeface="Courier New" panose="02070309020205020404" pitchFamily="49" charset="0"/>
+              </a:rPr>
+              <a:t>activityType</a:t>
+            </a:r>
+            <a:r>
+              <a:rPr lang="en-US" sz="1200" dirty="0">
+                <a:solidFill>
+                  <a:srgbClr val="3F115C"/>
+                </a:solidFill>
+                <a:latin typeface="Courier New" panose="02070309020205020404" pitchFamily="49" charset="0"/>
+                <a:cs typeface="Courier New" panose="02070309020205020404" pitchFamily="49" charset="0"/>
+              </a:rPr>
+              <a:t>": "</a:t>
+            </a:r>
+            <a:r>
+              <a:rPr lang="en-US" sz="1200" dirty="0" err="1">
+                <a:solidFill>
+                  <a:srgbClr val="3F115C"/>
+                </a:solidFill>
+                <a:latin typeface="Courier New" panose="02070309020205020404" pitchFamily="49" charset="0"/>
+                <a:cs typeface="Courier New" panose="02070309020205020404" pitchFamily="49" charset="0"/>
+              </a:rPr>
+              <a:t>userMention</a:t>
+            </a:r>
+            <a:r>
+              <a:rPr lang="en-US" sz="1200" dirty="0">
+                <a:solidFill>
+                  <a:srgbClr val="3F115C"/>
+                </a:solidFill>
                 <a:latin typeface="Courier New" panose="02070309020205020404" pitchFamily="49" charset="0"/>
                 <a:cs typeface="Courier New" panose="02070309020205020404" pitchFamily="49" charset="0"/>
               </a:rPr>
@@ -18147,44 +18387,158 @@
           </a:p>
           <a:p>
             <a:r>
-              <a:rPr lang="en-US" dirty="0">
-                <a:latin typeface="Courier New" panose="02070309020205020404" pitchFamily="49" charset="0"/>
-                <a:cs typeface="Courier New" panose="02070309020205020404" pitchFamily="49" charset="0"/>
-              </a:rPr>
-              <a:t>    "value": `https://</a:t>
-            </a:r>
-            <a:r>
-              <a:rPr lang="en-US" dirty="0" err="1">
-                <a:latin typeface="Courier New" panose="02070309020205020404" pitchFamily="49" charset="0"/>
-                <a:cs typeface="Courier New" panose="02070309020205020404" pitchFamily="49" charset="0"/>
-              </a:rPr>
-              <a:t>graph.microsoft.com</a:t>
-            </a:r>
-            <a:r>
-              <a:rPr lang="en-US" dirty="0">
-                <a:latin typeface="Courier New" panose="02070309020205020404" pitchFamily="49" charset="0"/>
-                <a:cs typeface="Courier New" panose="02070309020205020404" pitchFamily="49" charset="0"/>
-              </a:rPr>
-              <a:t>/beta/teams/{</a:t>
-            </a:r>
-            <a:r>
-              <a:rPr lang="en-US" dirty="0" err="1">
-                <a:latin typeface="Courier New" panose="02070309020205020404" pitchFamily="49" charset="0"/>
-                <a:cs typeface="Courier New" panose="02070309020205020404" pitchFamily="49" charset="0"/>
-              </a:rPr>
-              <a:t>groupId</a:t>
-            </a:r>
-            <a:r>
-              <a:rPr lang="en-US" dirty="0">
-                <a:latin typeface="Courier New" panose="02070309020205020404" pitchFamily="49" charset="0"/>
-                <a:cs typeface="Courier New" panose="02070309020205020404" pitchFamily="49" charset="0"/>
-              </a:rPr>
-              <a:t>}`</a:t>
-            </a:r>
-          </a:p>
-          <a:p>
-            <a:r>
-              <a:rPr lang="en-US" dirty="0">
+              <a:rPr lang="en-US" sz="1200" dirty="0">
+                <a:solidFill>
+                  <a:srgbClr val="3F115C"/>
+                </a:solidFill>
+                <a:latin typeface="Courier New" panose="02070309020205020404" pitchFamily="49" charset="0"/>
+                <a:cs typeface="Courier New" panose="02070309020205020404" pitchFamily="49" charset="0"/>
+              </a:rPr>
+              <a:t>  "</a:t>
+            </a:r>
+            <a:r>
+              <a:rPr lang="en-US" sz="1200" dirty="0" err="1">
+                <a:solidFill>
+                  <a:srgbClr val="3F115C"/>
+                </a:solidFill>
+                <a:latin typeface="Courier New" panose="02070309020205020404" pitchFamily="49" charset="0"/>
+                <a:cs typeface="Courier New" panose="02070309020205020404" pitchFamily="49" charset="0"/>
+              </a:rPr>
+              <a:t>previewText</a:t>
+            </a:r>
+            <a:r>
+              <a:rPr lang="en-US" sz="1200" dirty="0">
+                <a:solidFill>
+                  <a:srgbClr val="3F115C"/>
+                </a:solidFill>
+                <a:latin typeface="Courier New" panose="02070309020205020404" pitchFamily="49" charset="0"/>
+                <a:cs typeface="Courier New" panose="02070309020205020404" pitchFamily="49" charset="0"/>
+              </a:rPr>
+              <a:t>": { "content": "New tab created" },</a:t>
+            </a:r>
+          </a:p>
+          <a:p>
+            <a:r>
+              <a:rPr lang="en-US" sz="1200" dirty="0">
+                <a:solidFill>
+                  <a:srgbClr val="3F115C"/>
+                </a:solidFill>
+                <a:latin typeface="Courier New" panose="02070309020205020404" pitchFamily="49" charset="0"/>
+                <a:cs typeface="Courier New" panose="02070309020205020404" pitchFamily="49" charset="0"/>
+              </a:rPr>
+              <a:t>  "recipient": {</a:t>
+            </a:r>
+          </a:p>
+          <a:p>
+            <a:r>
+              <a:rPr lang="en-US" sz="1200" dirty="0">
+                <a:solidFill>
+                  <a:srgbClr val="3F115C"/>
+                </a:solidFill>
+                <a:latin typeface="Courier New" panose="02070309020205020404" pitchFamily="49" charset="0"/>
+                <a:cs typeface="Courier New" panose="02070309020205020404" pitchFamily="49" charset="0"/>
+              </a:rPr>
+              <a:t>    "@</a:t>
+            </a:r>
+            <a:r>
+              <a:rPr lang="en-US" sz="1200" dirty="0" err="1">
+                <a:solidFill>
+                  <a:srgbClr val="3F115C"/>
+                </a:solidFill>
+                <a:latin typeface="Courier New" panose="02070309020205020404" pitchFamily="49" charset="0"/>
+                <a:cs typeface="Courier New" panose="02070309020205020404" pitchFamily="49" charset="0"/>
+              </a:rPr>
+              <a:t>odata.type</a:t>
+            </a:r>
+            <a:r>
+              <a:rPr lang="en-US" sz="1200" dirty="0">
+                <a:solidFill>
+                  <a:srgbClr val="3F115C"/>
+                </a:solidFill>
+                <a:latin typeface="Courier New" panose="02070309020205020404" pitchFamily="49" charset="0"/>
+                <a:cs typeface="Courier New" panose="02070309020205020404" pitchFamily="49" charset="0"/>
+              </a:rPr>
+              <a:t>": "</a:t>
+            </a:r>
+            <a:r>
+              <a:rPr lang="en-US" sz="1200" dirty="0" err="1">
+                <a:solidFill>
+                  <a:srgbClr val="3F115C"/>
+                </a:solidFill>
+                <a:latin typeface="Courier New" panose="02070309020205020404" pitchFamily="49" charset="0"/>
+                <a:cs typeface="Courier New" panose="02070309020205020404" pitchFamily="49" charset="0"/>
+              </a:rPr>
+              <a:t>microsoft.graph.aadUserNotificationRecipient</a:t>
+            </a:r>
+            <a:r>
+              <a:rPr lang="en-US" sz="1200" dirty="0">
+                <a:solidFill>
+                  <a:srgbClr val="3F115C"/>
+                </a:solidFill>
+                <a:latin typeface="Courier New" panose="02070309020205020404" pitchFamily="49" charset="0"/>
+                <a:cs typeface="Courier New" panose="02070309020205020404" pitchFamily="49" charset="0"/>
+              </a:rPr>
+              <a:t>",</a:t>
+            </a:r>
+          </a:p>
+          <a:p>
+            <a:r>
+              <a:rPr lang="en-US" sz="1200" dirty="0">
+                <a:solidFill>
+                  <a:srgbClr val="3F115C"/>
+                </a:solidFill>
+                <a:latin typeface="Courier New" panose="02070309020205020404" pitchFamily="49" charset="0"/>
+                <a:cs typeface="Courier New" panose="02070309020205020404" pitchFamily="49" charset="0"/>
+              </a:rPr>
+              <a:t>    "</a:t>
+            </a:r>
+            <a:r>
+              <a:rPr lang="en-US" sz="1200" dirty="0" err="1">
+                <a:solidFill>
+                  <a:srgbClr val="3F115C"/>
+                </a:solidFill>
+                <a:latin typeface="Courier New" panose="02070309020205020404" pitchFamily="49" charset="0"/>
+                <a:cs typeface="Courier New" panose="02070309020205020404" pitchFamily="49" charset="0"/>
+              </a:rPr>
+              <a:t>userId</a:t>
+            </a:r>
+            <a:r>
+              <a:rPr lang="en-US" sz="1200" dirty="0">
+                <a:solidFill>
+                  <a:srgbClr val="3F115C"/>
+                </a:solidFill>
+                <a:latin typeface="Courier New" panose="02070309020205020404" pitchFamily="49" charset="0"/>
+                <a:cs typeface="Courier New" panose="02070309020205020404" pitchFamily="49" charset="0"/>
+              </a:rPr>
+              <a:t>": "{recipient-</a:t>
+            </a:r>
+            <a:r>
+              <a:rPr lang="en-US" sz="1200" dirty="0" err="1">
+                <a:solidFill>
+                  <a:srgbClr val="3F115C"/>
+                </a:solidFill>
+                <a:latin typeface="Courier New" panose="02070309020205020404" pitchFamily="49" charset="0"/>
+                <a:cs typeface="Courier New" panose="02070309020205020404" pitchFamily="49" charset="0"/>
+              </a:rPr>
+              <a:t>objectID</a:t>
+            </a:r>
+            <a:r>
+              <a:rPr lang="en-US" sz="1200" dirty="0">
+                <a:solidFill>
+                  <a:srgbClr val="3F115C"/>
+                </a:solidFill>
+                <a:latin typeface="Courier New" panose="02070309020205020404" pitchFamily="49" charset="0"/>
+                <a:cs typeface="Courier New" panose="02070309020205020404" pitchFamily="49" charset="0"/>
+              </a:rPr>
+              <a:t>}"</a:t>
+            </a:r>
+          </a:p>
+          <a:p>
+            <a:r>
+              <a:rPr lang="en-US" sz="1200" dirty="0">
+                <a:solidFill>
+                  <a:srgbClr val="3F115C"/>
+                </a:solidFill>
                 <a:latin typeface="Courier New" panose="02070309020205020404" pitchFamily="49" charset="0"/>
                 <a:cs typeface="Courier New" panose="02070309020205020404" pitchFamily="49" charset="0"/>
               </a:rPr>
@@ -18193,173 +18547,30 @@
           </a:p>
           <a:p>
             <a:r>
-              <a:rPr lang="en-US" dirty="0">
+              <a:rPr lang="en-US" sz="1200" dirty="0">
+                <a:solidFill>
+                  <a:srgbClr val="3F115C"/>
+                </a:solidFill>
                 <a:latin typeface="Courier New" panose="02070309020205020404" pitchFamily="49" charset="0"/>
                 <a:cs typeface="Courier New" panose="02070309020205020404" pitchFamily="49" charset="0"/>
               </a:rPr>
               <a:t>  "</a:t>
             </a:r>
             <a:r>
-              <a:rPr lang="en-US" dirty="0" err="1">
-                <a:latin typeface="Courier New" panose="02070309020205020404" pitchFamily="49" charset="0"/>
-                <a:cs typeface="Courier New" panose="02070309020205020404" pitchFamily="49" charset="0"/>
-              </a:rPr>
-              <a:t>activityType</a:t>
-            </a:r>
-            <a:r>
-              <a:rPr lang="en-US" dirty="0">
-                <a:latin typeface="Courier New" panose="02070309020205020404" pitchFamily="49" charset="0"/>
-                <a:cs typeface="Courier New" panose="02070309020205020404" pitchFamily="49" charset="0"/>
-              </a:rPr>
-              <a:t>": "</a:t>
-            </a:r>
-            <a:r>
-              <a:rPr lang="en-US" dirty="0" err="1">
-                <a:latin typeface="Courier New" panose="02070309020205020404" pitchFamily="49" charset="0"/>
-                <a:cs typeface="Courier New" panose="02070309020205020404" pitchFamily="49" charset="0"/>
-              </a:rPr>
-              <a:t>userMention</a:t>
-            </a:r>
-            <a:r>
-              <a:rPr lang="en-US" dirty="0">
-                <a:latin typeface="Courier New" panose="02070309020205020404" pitchFamily="49" charset="0"/>
-                <a:cs typeface="Courier New" panose="02070309020205020404" pitchFamily="49" charset="0"/>
-              </a:rPr>
-              <a:t>",</a:t>
-            </a:r>
-          </a:p>
-          <a:p>
-            <a:r>
-              <a:rPr lang="en-US" dirty="0">
-                <a:latin typeface="Courier New" panose="02070309020205020404" pitchFamily="49" charset="0"/>
-                <a:cs typeface="Courier New" panose="02070309020205020404" pitchFamily="49" charset="0"/>
-              </a:rPr>
-              <a:t>  "</a:t>
-            </a:r>
-            <a:r>
-              <a:rPr lang="en-US" dirty="0" err="1">
-                <a:latin typeface="Courier New" panose="02070309020205020404" pitchFamily="49" charset="0"/>
-                <a:cs typeface="Courier New" panose="02070309020205020404" pitchFamily="49" charset="0"/>
-              </a:rPr>
-              <a:t>previewText</a:t>
-            </a:r>
-            <a:r>
-              <a:rPr lang="en-US" dirty="0">
-                <a:latin typeface="Courier New" panose="02070309020205020404" pitchFamily="49" charset="0"/>
-                <a:cs typeface="Courier New" panose="02070309020205020404" pitchFamily="49" charset="0"/>
-              </a:rPr>
-              <a:t>": { "content": "New tab created" },</a:t>
-            </a:r>
-          </a:p>
-          <a:p>
-            <a:r>
-              <a:rPr lang="en-US" dirty="0">
-                <a:latin typeface="Courier New" panose="02070309020205020404" pitchFamily="49" charset="0"/>
-                <a:cs typeface="Courier New" panose="02070309020205020404" pitchFamily="49" charset="0"/>
-              </a:rPr>
-              <a:t>  "recipient": {</a:t>
-            </a:r>
-          </a:p>
-          <a:p>
-            <a:r>
-              <a:rPr lang="en-US" dirty="0">
-                <a:latin typeface="Courier New" panose="02070309020205020404" pitchFamily="49" charset="0"/>
-                <a:cs typeface="Courier New" panose="02070309020205020404" pitchFamily="49" charset="0"/>
-              </a:rPr>
-              <a:t>    "@</a:t>
-            </a:r>
-            <a:r>
-              <a:rPr lang="en-US" dirty="0" err="1">
-                <a:latin typeface="Courier New" panose="02070309020205020404" pitchFamily="49" charset="0"/>
-                <a:cs typeface="Courier New" panose="02070309020205020404" pitchFamily="49" charset="0"/>
-              </a:rPr>
-              <a:t>odata.type</a:t>
-            </a:r>
-            <a:r>
-              <a:rPr lang="en-US" dirty="0">
-                <a:latin typeface="Courier New" panose="02070309020205020404" pitchFamily="49" charset="0"/>
-                <a:cs typeface="Courier New" panose="02070309020205020404" pitchFamily="49" charset="0"/>
-              </a:rPr>
-              <a:t>": "</a:t>
-            </a:r>
-            <a:r>
-              <a:rPr lang="en-US" dirty="0" err="1">
-                <a:latin typeface="Courier New" panose="02070309020205020404" pitchFamily="49" charset="0"/>
-                <a:cs typeface="Courier New" panose="02070309020205020404" pitchFamily="49" charset="0"/>
-              </a:rPr>
-              <a:t>microsoft.graph.aadUserNotificationRecipient</a:t>
-            </a:r>
-            <a:r>
-              <a:rPr lang="en-US" dirty="0">
-                <a:latin typeface="Courier New" panose="02070309020205020404" pitchFamily="49" charset="0"/>
-                <a:cs typeface="Courier New" panose="02070309020205020404" pitchFamily="49" charset="0"/>
-              </a:rPr>
-              <a:t>",</a:t>
-            </a:r>
-          </a:p>
-          <a:p>
-            <a:r>
-              <a:rPr lang="en-US" dirty="0">
-                <a:latin typeface="Courier New" panose="02070309020205020404" pitchFamily="49" charset="0"/>
-                <a:cs typeface="Courier New" panose="02070309020205020404" pitchFamily="49" charset="0"/>
-              </a:rPr>
-              <a:t>    "</a:t>
-            </a:r>
-            <a:r>
-              <a:rPr lang="en-US" dirty="0" err="1">
-                <a:latin typeface="Courier New" panose="02070309020205020404" pitchFamily="49" charset="0"/>
-                <a:cs typeface="Courier New" panose="02070309020205020404" pitchFamily="49" charset="0"/>
-              </a:rPr>
-              <a:t>userId</a:t>
-            </a:r>
-            <a:r>
-              <a:rPr lang="en-US" dirty="0">
-                <a:latin typeface="Courier New" panose="02070309020205020404" pitchFamily="49" charset="0"/>
-                <a:cs typeface="Courier New" panose="02070309020205020404" pitchFamily="49" charset="0"/>
-              </a:rPr>
-              <a:t>": "{recipient-</a:t>
-            </a:r>
-            <a:r>
-              <a:rPr lang="en-US" dirty="0" err="1">
-                <a:latin typeface="Courier New" panose="02070309020205020404" pitchFamily="49" charset="0"/>
-                <a:cs typeface="Courier New" panose="02070309020205020404" pitchFamily="49" charset="0"/>
-              </a:rPr>
-              <a:t>objectID</a:t>
-            </a:r>
-            <a:r>
-              <a:rPr lang="en-US" dirty="0">
-                <a:latin typeface="Courier New" panose="02070309020205020404" pitchFamily="49" charset="0"/>
-                <a:cs typeface="Courier New" panose="02070309020205020404" pitchFamily="49" charset="0"/>
-              </a:rPr>
-              <a:t>}"</a:t>
-            </a:r>
-          </a:p>
-          <a:p>
-            <a:r>
-              <a:rPr lang="en-US" dirty="0">
-                <a:latin typeface="Courier New" panose="02070309020205020404" pitchFamily="49" charset="0"/>
-                <a:cs typeface="Courier New" panose="02070309020205020404" pitchFamily="49" charset="0"/>
-              </a:rPr>
-              <a:t>  },</a:t>
-            </a:r>
-          </a:p>
-          <a:p>
-            <a:r>
-              <a:rPr lang="en-US" dirty="0">
-                <a:latin typeface="Courier New" panose="02070309020205020404" pitchFamily="49" charset="0"/>
-                <a:cs typeface="Courier New" panose="02070309020205020404" pitchFamily="49" charset="0"/>
-              </a:rPr>
-              <a:t>  "</a:t>
-            </a:r>
-            <a:r>
-              <a:rPr lang="en-US" dirty="0" err="1">
+              <a:rPr lang="en-US" sz="1200" dirty="0" err="1">
+                <a:solidFill>
+                  <a:srgbClr val="3F115C"/>
+                </a:solidFill>
                 <a:latin typeface="Courier New" panose="02070309020205020404" pitchFamily="49" charset="0"/>
                 <a:cs typeface="Courier New" panose="02070309020205020404" pitchFamily="49" charset="0"/>
               </a:rPr>
               <a:t>templateParameters</a:t>
             </a:r>
             <a:r>
-              <a:rPr lang="en-US" dirty="0">
+              <a:rPr lang="en-US" sz="1200" dirty="0">
+                <a:solidFill>
+                  <a:srgbClr val="3F115C"/>
+                </a:solidFill>
                 <a:latin typeface="Courier New" panose="02070309020205020404" pitchFamily="49" charset="0"/>
                 <a:cs typeface="Courier New" panose="02070309020205020404" pitchFamily="49" charset="0"/>
               </a:rPr>
@@ -18368,21 +18579,30 @@
           </a:p>
           <a:p>
             <a:r>
-              <a:rPr lang="en-US" dirty="0">
+              <a:rPr lang="en-US" sz="1200" dirty="0">
+                <a:solidFill>
+                  <a:srgbClr val="3F115C"/>
+                </a:solidFill>
                 <a:latin typeface="Courier New" panose="02070309020205020404" pitchFamily="49" charset="0"/>
                 <a:cs typeface="Courier New" panose="02070309020205020404" pitchFamily="49" charset="0"/>
               </a:rPr>
               <a:t>    { "name": "</a:t>
             </a:r>
             <a:r>
-              <a:rPr lang="en-US" dirty="0" err="1">
+              <a:rPr lang="en-US" sz="1200" dirty="0" err="1">
+                <a:solidFill>
+                  <a:srgbClr val="3F115C"/>
+                </a:solidFill>
                 <a:latin typeface="Courier New" panose="02070309020205020404" pitchFamily="49" charset="0"/>
                 <a:cs typeface="Courier New" panose="02070309020205020404" pitchFamily="49" charset="0"/>
               </a:rPr>
               <a:t>tabName</a:t>
             </a:r>
             <a:r>
-              <a:rPr lang="en-US" dirty="0">
+              <a:rPr lang="en-US" sz="1200" dirty="0">
+                <a:solidFill>
+                  <a:srgbClr val="3F115C"/>
+                </a:solidFill>
                 <a:latin typeface="Courier New" panose="02070309020205020404" pitchFamily="49" charset="0"/>
                 <a:cs typeface="Courier New" panose="02070309020205020404" pitchFamily="49" charset="0"/>
               </a:rPr>
@@ -18391,7 +18611,10 @@
           </a:p>
           <a:p>
             <a:r>
-              <a:rPr lang="en-US" dirty="0">
+              <a:rPr lang="en-US" sz="1200" dirty="0">
+                <a:solidFill>
+                  <a:srgbClr val="3F115C"/>
+                </a:solidFill>
                 <a:latin typeface="Courier New" panose="02070309020205020404" pitchFamily="49" charset="0"/>
                 <a:cs typeface="Courier New" panose="02070309020205020404" pitchFamily="49" charset="0"/>
               </a:rPr>
@@ -18400,21 +18623,15 @@
           </a:p>
           <a:p>
             <a:r>
-              <a:rPr lang="en-US" dirty="0">
+              <a:rPr lang="en-US" sz="1200" dirty="0">
+                <a:solidFill>
+                  <a:srgbClr val="3F115C"/>
+                </a:solidFill>
                 <a:latin typeface="Courier New" panose="02070309020205020404" pitchFamily="49" charset="0"/>
                 <a:cs typeface="Courier New" panose="02070309020205020404" pitchFamily="49" charset="0"/>
               </a:rPr>
               <a:t>}</a:t>
             </a:r>
-          </a:p>
-          <a:p>
-            <a:endParaRPr lang="en-US" dirty="0">
-              <a:latin typeface="Courier New" panose="02070309020205020404" pitchFamily="49" charset="0"/>
-              <a:cs typeface="Courier New" panose="02070309020205020404" pitchFamily="49" charset="0"/>
-            </a:endParaRPr>
-          </a:p>
-          <a:p>
-            <a:endParaRPr lang="en-US" dirty="0"/>
           </a:p>
         </p:txBody>
       </p:sp>
@@ -18507,7 +18724,7 @@
             <a:pPr marL="457200" lvl="0" indent="-457200"/>
             <a:r>
               <a:rPr lang="en-US" dirty="0"/>
-              <a:t>Get work done even when no one is    around</a:t>
+              <a:t>Get work done even when no one is around</a:t>
             </a:r>
           </a:p>
           <a:p>
@@ -19128,7 +19345,7 @@
         <p:spPr/>
         <p:txBody>
           <a:bodyPr>
-            <a:normAutofit fontScale="62500" lnSpcReduction="20000"/>
+            <a:normAutofit fontScale="70000" lnSpcReduction="20000"/>
           </a:bodyPr>
           <a:lstStyle/>
           <a:p>
@@ -19201,71 +19418,113 @@
           <a:p>
             <a:pPr lvl="1"/>
             <a:r>
-              <a:rPr lang="en-US" dirty="0" err="1"/>
+              <a:rPr lang="en-US" dirty="0" err="1">
+                <a:latin typeface="Courier New" panose="02070309020205020404" pitchFamily="49" charset="0"/>
+                <a:cs typeface="Courier New" panose="02070309020205020404" pitchFamily="49" charset="0"/>
+              </a:rPr>
               <a:t>TeamsApp</a:t>
             </a:r>
             <a:r>
-              <a:rPr lang="en-US" dirty="0"/>
+              <a:rPr lang="en-US" dirty="0">
+                <a:latin typeface="Courier New" panose="02070309020205020404" pitchFamily="49" charset="0"/>
+                <a:cs typeface="Courier New" panose="02070309020205020404" pitchFamily="49" charset="0"/>
+              </a:rPr>
               <a:t>.*</a:t>
             </a:r>
           </a:p>
           <a:p>
             <a:pPr lvl="1"/>
             <a:r>
-              <a:rPr lang="en-US" dirty="0" err="1"/>
+              <a:rPr lang="en-US" dirty="0" err="1">
+                <a:latin typeface="Courier New" panose="02070309020205020404" pitchFamily="49" charset="0"/>
+                <a:cs typeface="Courier New" panose="02070309020205020404" pitchFamily="49" charset="0"/>
+              </a:rPr>
               <a:t>TeamSettings</a:t>
             </a:r>
             <a:r>
-              <a:rPr lang="en-US" dirty="0"/>
+              <a:rPr lang="en-US" dirty="0">
+                <a:latin typeface="Courier New" panose="02070309020205020404" pitchFamily="49" charset="0"/>
+                <a:cs typeface="Courier New" panose="02070309020205020404" pitchFamily="49" charset="0"/>
+              </a:rPr>
               <a:t>.*</a:t>
             </a:r>
           </a:p>
           <a:p>
             <a:pPr lvl="1"/>
             <a:r>
-              <a:rPr lang="en-US" dirty="0" err="1"/>
+              <a:rPr lang="en-US" dirty="0" err="1">
+                <a:latin typeface="Courier New" panose="02070309020205020404" pitchFamily="49" charset="0"/>
+                <a:cs typeface="Courier New" panose="02070309020205020404" pitchFamily="49" charset="0"/>
+              </a:rPr>
               <a:t>TeamsTab</a:t>
             </a:r>
             <a:r>
-              <a:rPr lang="en-US" dirty="0"/>
+              <a:rPr lang="en-US" dirty="0">
+                <a:latin typeface="Courier New" panose="02070309020205020404" pitchFamily="49" charset="0"/>
+                <a:cs typeface="Courier New" panose="02070309020205020404" pitchFamily="49" charset="0"/>
+              </a:rPr>
               <a:t>.*</a:t>
             </a:r>
           </a:p>
           <a:p>
             <a:pPr lvl="1"/>
             <a:r>
-              <a:rPr lang="en-US" dirty="0" err="1"/>
+              <a:rPr lang="en-US" dirty="0" err="1">
+                <a:latin typeface="Courier New" panose="02070309020205020404" pitchFamily="49" charset="0"/>
+                <a:cs typeface="Courier New" panose="02070309020205020404" pitchFamily="49" charset="0"/>
+              </a:rPr>
               <a:t>Team.Create</a:t>
             </a:r>
-            <a:endParaRPr lang="en-US" dirty="0"/>
+            <a:endParaRPr lang="en-US" dirty="0">
+              <a:latin typeface="Courier New" panose="02070309020205020404" pitchFamily="49" charset="0"/>
+              <a:cs typeface="Courier New" panose="02070309020205020404" pitchFamily="49" charset="0"/>
+            </a:endParaRPr>
           </a:p>
           <a:p>
             <a:pPr lvl="1"/>
             <a:r>
-              <a:rPr lang="en-US" dirty="0" err="1"/>
+              <a:rPr lang="en-US" dirty="0" err="1">
+                <a:latin typeface="Courier New" panose="02070309020205020404" pitchFamily="49" charset="0"/>
+                <a:cs typeface="Courier New" panose="02070309020205020404" pitchFamily="49" charset="0"/>
+              </a:rPr>
               <a:t>Team.ReadBasic.All</a:t>
             </a:r>
-            <a:endParaRPr lang="en-US" dirty="0"/>
+            <a:endParaRPr lang="en-US" dirty="0">
+              <a:latin typeface="Courier New" panose="02070309020205020404" pitchFamily="49" charset="0"/>
+              <a:cs typeface="Courier New" panose="02070309020205020404" pitchFamily="49" charset="0"/>
+            </a:endParaRPr>
           </a:p>
           <a:p>
             <a:pPr lvl="1"/>
             <a:r>
-              <a:rPr lang="en-US" dirty="0" err="1"/>
+              <a:rPr lang="en-US" dirty="0" err="1">
+                <a:latin typeface="Courier New" panose="02070309020205020404" pitchFamily="49" charset="0"/>
+                <a:cs typeface="Courier New" panose="02070309020205020404" pitchFamily="49" charset="0"/>
+              </a:rPr>
               <a:t>TeamMember</a:t>
             </a:r>
             <a:r>
-              <a:rPr lang="en-US" dirty="0"/>
+              <a:rPr lang="en-US" dirty="0">
+                <a:latin typeface="Courier New" panose="02070309020205020404" pitchFamily="49" charset="0"/>
+                <a:cs typeface="Courier New" panose="02070309020205020404" pitchFamily="49" charset="0"/>
+              </a:rPr>
               <a:t>.*</a:t>
             </a:r>
           </a:p>
           <a:p>
             <a:pPr lvl="1"/>
             <a:r>
-              <a:rPr lang="en-US" dirty="0" err="1"/>
+              <a:rPr lang="en-US" dirty="0" err="1">
+                <a:latin typeface="Courier New" panose="02070309020205020404" pitchFamily="49" charset="0"/>
+                <a:cs typeface="Courier New" panose="02070309020205020404" pitchFamily="49" charset="0"/>
+              </a:rPr>
               <a:t>TeamsActivity</a:t>
             </a:r>
             <a:r>
-              <a:rPr lang="en-US" dirty="0"/>
+              <a:rPr lang="en-US" dirty="0">
+                <a:latin typeface="Courier New" panose="02070309020205020404" pitchFamily="49" charset="0"/>
+                <a:cs typeface="Courier New" panose="02070309020205020404" pitchFamily="49" charset="0"/>
+              </a:rPr>
               <a:t>.*</a:t>
             </a:r>
           </a:p>
@@ -19872,6 +20131,9 @@
             </a:pPr>
             <a:r>
               <a:rPr lang="en-US" sz="2000" dirty="0">
+                <a:solidFill>
+                  <a:srgbClr val="3F115C"/>
+                </a:solidFill>
                 <a:latin typeface="Courier New" panose="02070309020205020404" pitchFamily="49" charset="0"/>
                 <a:cs typeface="Courier New" panose="02070309020205020404" pitchFamily="49" charset="0"/>
               </a:rPr>
@@ -19879,6 +20141,9 @@
             </a:r>
             <a:r>
               <a:rPr lang="en-US" sz="2000" b="1" dirty="0">
+                <a:solidFill>
+                  <a:srgbClr val="3F115C"/>
+                </a:solidFill>
                 <a:latin typeface="Courier New" panose="02070309020205020404" pitchFamily="49" charset="0"/>
                 <a:cs typeface="Courier New" panose="02070309020205020404" pitchFamily="49" charset="0"/>
               </a:rPr>
@@ -19886,6 +20151,9 @@
             </a:r>
             <a:r>
               <a:rPr lang="en-US" sz="2000" b="1" dirty="0" err="1">
+                <a:solidFill>
+                  <a:srgbClr val="3F115C"/>
+                </a:solidFill>
                 <a:latin typeface="Courier New" panose="02070309020205020404" pitchFamily="49" charset="0"/>
                 <a:cs typeface="Courier New" panose="02070309020205020404" pitchFamily="49" charset="0"/>
               </a:rPr>
@@ -19893,10 +20161,13 @@
             </a:r>
             <a:r>
               <a:rPr lang="en-US" sz="2000" b="1" dirty="0">
-                <a:latin typeface="Courier New" panose="02070309020205020404" pitchFamily="49" charset="0"/>
-                <a:cs typeface="Courier New" panose="02070309020205020404" pitchFamily="49" charset="0"/>
-              </a:rPr>
-              <a:t>/beta/teams</a:t>
+                <a:solidFill>
+                  <a:srgbClr val="3F115C"/>
+                </a:solidFill>
+                <a:latin typeface="Courier New" panose="02070309020205020404" pitchFamily="49" charset="0"/>
+                <a:cs typeface="Courier New" panose="02070309020205020404" pitchFamily="49" charset="0"/>
+              </a:rPr>
+              <a:t>/v1.0/teams</a:t>
             </a:r>
           </a:p>
           <a:p>
@@ -19905,6 +20176,9 @@
             </a:pPr>
             <a:r>
               <a:rPr lang="en-US" sz="2000" dirty="0">
+                <a:solidFill>
+                  <a:srgbClr val="3F115C"/>
+                </a:solidFill>
                 <a:latin typeface="Courier New" panose="02070309020205020404" pitchFamily="49" charset="0"/>
                 <a:cs typeface="Courier New" panose="02070309020205020404" pitchFamily="49" charset="0"/>
               </a:rPr>
@@ -19917,6 +20191,9 @@
             </a:pPr>
             <a:r>
               <a:rPr lang="en-US" sz="2000" dirty="0">
+                <a:solidFill>
+                  <a:srgbClr val="3F115C"/>
+                </a:solidFill>
                 <a:latin typeface="Courier New" panose="02070309020205020404" pitchFamily="49" charset="0"/>
                 <a:cs typeface="Courier New" panose="02070309020205020404" pitchFamily="49" charset="0"/>
               </a:rPr>
@@ -19929,6 +20206,9 @@
             </a:pPr>
             <a:r>
               <a:rPr lang="en-US" sz="2000" dirty="0">
+                <a:solidFill>
+                  <a:srgbClr val="3F115C"/>
+                </a:solidFill>
                 <a:latin typeface="Courier New" panose="02070309020205020404" pitchFamily="49" charset="0"/>
                 <a:cs typeface="Courier New" panose="02070309020205020404" pitchFamily="49" charset="0"/>
               </a:rPr>
@@ -19936,6 +20216,9 @@
             </a:r>
             <a:r>
               <a:rPr lang="en-US" sz="2000" dirty="0" err="1">
+                <a:solidFill>
+                  <a:srgbClr val="3F115C"/>
+                </a:solidFill>
                 <a:latin typeface="Courier New" panose="02070309020205020404" pitchFamily="49" charset="0"/>
                 <a:cs typeface="Courier New" panose="02070309020205020404" pitchFamily="49" charset="0"/>
               </a:rPr>
@@ -19943,6 +20226,9 @@
             </a:r>
             <a:r>
               <a:rPr lang="en-US" sz="2000" dirty="0">
+                <a:solidFill>
+                  <a:srgbClr val="3F115C"/>
+                </a:solidFill>
                 <a:latin typeface="Courier New" panose="02070309020205020404" pitchFamily="49" charset="0"/>
                 <a:cs typeface="Courier New" panose="02070309020205020404" pitchFamily="49" charset="0"/>
               </a:rPr>
@@ -19950,12 +20236,18 @@
             </a:r>
             <a:br>
               <a:rPr lang="en-US" sz="2000" dirty="0">
+                <a:solidFill>
+                  <a:srgbClr val="3F115C"/>
+                </a:solidFill>
                 <a:latin typeface="Courier New" panose="02070309020205020404" pitchFamily="49" charset="0"/>
                 <a:cs typeface="Courier New" panose="02070309020205020404" pitchFamily="49" charset="0"/>
               </a:rPr>
             </a:br>
             <a:r>
               <a:rPr lang="en-US" sz="2000" dirty="0">
+                <a:solidFill>
+                  <a:srgbClr val="3F115C"/>
+                </a:solidFill>
                 <a:latin typeface="Courier New" panose="02070309020205020404" pitchFamily="49" charset="0"/>
                 <a:cs typeface="Courier New" panose="02070309020205020404" pitchFamily="49" charset="0"/>
               </a:rPr>
@@ -19963,6 +20255,9 @@
             </a:r>
             <a:r>
               <a:rPr lang="en-US" sz="2000" dirty="0" err="1">
+                <a:solidFill>
+                  <a:srgbClr val="3F115C"/>
+                </a:solidFill>
                 <a:latin typeface="Courier New" panose="02070309020205020404" pitchFamily="49" charset="0"/>
                 <a:cs typeface="Courier New" panose="02070309020205020404" pitchFamily="49" charset="0"/>
               </a:rPr>
@@ -19970,13 +20265,19 @@
             </a:r>
             <a:r>
               <a:rPr lang="en-US" sz="2000" dirty="0">
-                <a:latin typeface="Courier New" panose="02070309020205020404" pitchFamily="49" charset="0"/>
-                <a:cs typeface="Courier New" panose="02070309020205020404" pitchFamily="49" charset="0"/>
-              </a:rPr>
-              <a:t>/beta/</a:t>
+                <a:solidFill>
+                  <a:srgbClr val="3F115C"/>
+                </a:solidFill>
+                <a:latin typeface="Courier New" panose="02070309020205020404" pitchFamily="49" charset="0"/>
+                <a:cs typeface="Courier New" panose="02070309020205020404" pitchFamily="49" charset="0"/>
+              </a:rPr>
+              <a:t>/v1.0/</a:t>
             </a:r>
             <a:r>
               <a:rPr lang="en-US" sz="2000" dirty="0" err="1">
+                <a:solidFill>
+                  <a:srgbClr val="3F115C"/>
+                </a:solidFill>
                 <a:latin typeface="Courier New" panose="02070309020205020404" pitchFamily="49" charset="0"/>
                 <a:cs typeface="Courier New" panose="02070309020205020404" pitchFamily="49" charset="0"/>
               </a:rPr>
@@ -19984,6 +20285,9 @@
             </a:r>
             <a:r>
               <a:rPr lang="en-US" sz="2000" dirty="0">
+                <a:solidFill>
+                  <a:srgbClr val="3F115C"/>
+                </a:solidFill>
                 <a:latin typeface="Courier New" panose="02070309020205020404" pitchFamily="49" charset="0"/>
                 <a:cs typeface="Courier New" panose="02070309020205020404" pitchFamily="49" charset="0"/>
               </a:rPr>
@@ -19996,6 +20300,9 @@
             </a:pPr>
             <a:r>
               <a:rPr lang="en-US" sz="2000" dirty="0">
+                <a:solidFill>
+                  <a:srgbClr val="3F115C"/>
+                </a:solidFill>
                 <a:latin typeface="Courier New" panose="02070309020205020404" pitchFamily="49" charset="0"/>
                 <a:cs typeface="Courier New" panose="02070309020205020404" pitchFamily="49" charset="0"/>
               </a:rPr>
@@ -20003,6 +20310,9 @@
             </a:r>
             <a:r>
               <a:rPr lang="en-US" sz="2000" dirty="0" err="1">
+                <a:solidFill>
+                  <a:srgbClr val="3F115C"/>
+                </a:solidFill>
                 <a:latin typeface="Courier New" panose="02070309020205020404" pitchFamily="49" charset="0"/>
                 <a:cs typeface="Courier New" panose="02070309020205020404" pitchFamily="49" charset="0"/>
               </a:rPr>
@@ -20010,6 +20320,9 @@
             </a:r>
             <a:r>
               <a:rPr lang="en-US" sz="2000" dirty="0">
+                <a:solidFill>
+                  <a:srgbClr val="3F115C"/>
+                </a:solidFill>
                 <a:latin typeface="Courier New" panose="02070309020205020404" pitchFamily="49" charset="0"/>
                 <a:cs typeface="Courier New" panose="02070309020205020404" pitchFamily="49" charset="0"/>
               </a:rPr>
@@ -20017,12 +20330,18 @@
             </a:r>
             <a:br>
               <a:rPr lang="en-US" sz="2000" dirty="0">
+                <a:solidFill>
+                  <a:srgbClr val="3F115C"/>
+                </a:solidFill>
                 <a:latin typeface="Courier New" panose="02070309020205020404" pitchFamily="49" charset="0"/>
                 <a:cs typeface="Courier New" panose="02070309020205020404" pitchFamily="49" charset="0"/>
               </a:rPr>
             </a:br>
             <a:r>
               <a:rPr lang="en-US" sz="2000" dirty="0">
+                <a:solidFill>
+                  <a:srgbClr val="3F115C"/>
+                </a:solidFill>
                 <a:latin typeface="Courier New" panose="02070309020205020404" pitchFamily="49" charset="0"/>
                 <a:cs typeface="Courier New" panose="02070309020205020404" pitchFamily="49" charset="0"/>
               </a:rPr>
@@ -20030,6 +20349,9 @@
             </a:r>
             <a:r>
               <a:rPr lang="en-US" sz="2000" dirty="0" err="1">
+                <a:solidFill>
+                  <a:srgbClr val="3F115C"/>
+                </a:solidFill>
                 <a:latin typeface="Courier New" panose="02070309020205020404" pitchFamily="49" charset="0"/>
                 <a:cs typeface="Courier New" panose="02070309020205020404" pitchFamily="49" charset="0"/>
               </a:rPr>
@@ -20037,6 +20359,9 @@
             </a:r>
             <a:r>
               <a:rPr lang="en-US" sz="2000" dirty="0">
+                <a:solidFill>
+                  <a:srgbClr val="3F115C"/>
+                </a:solidFill>
                 <a:latin typeface="Courier New" panose="02070309020205020404" pitchFamily="49" charset="0"/>
                 <a:cs typeface="Courier New" panose="02070309020205020404" pitchFamily="49" charset="0"/>
               </a:rPr>
@@ -20044,6 +20369,9 @@
             </a:r>
             <a:r>
               <a:rPr lang="en-US" sz="2000" dirty="0" err="1">
+                <a:solidFill>
+                  <a:srgbClr val="3F115C"/>
+                </a:solidFill>
                 <a:latin typeface="Courier New" panose="02070309020205020404" pitchFamily="49" charset="0"/>
                 <a:cs typeface="Courier New" panose="02070309020205020404" pitchFamily="49" charset="0"/>
               </a:rPr>
@@ -20051,6 +20379,9 @@
             </a:r>
             <a:r>
               <a:rPr lang="en-US" sz="2000" dirty="0">
+                <a:solidFill>
+                  <a:srgbClr val="3F115C"/>
+                </a:solidFill>
                 <a:latin typeface="Courier New" panose="02070309020205020404" pitchFamily="49" charset="0"/>
                 <a:cs typeface="Courier New" panose="02070309020205020404" pitchFamily="49" charset="0"/>
               </a:rPr>
@@ -20063,6 +20394,9 @@
             </a:pPr>
             <a:r>
               <a:rPr lang="en-US" sz="2000" dirty="0">
+                <a:solidFill>
+                  <a:srgbClr val="3F115C"/>
+                </a:solidFill>
                 <a:latin typeface="Courier New" panose="02070309020205020404" pitchFamily="49" charset="0"/>
                 <a:cs typeface="Courier New" panose="02070309020205020404" pitchFamily="49" charset="0"/>
               </a:rPr>
@@ -20071,12 +20405,19 @@
           </a:p>
           <a:p>
             <a:endParaRPr lang="en-US" sz="2000" dirty="0">
+              <a:solidFill>
+                <a:srgbClr val="3F115C"/>
+              </a:solidFill>
               <a:latin typeface="Courier New" panose="02070309020205020404" pitchFamily="49" charset="0"/>
               <a:cs typeface="Courier New" panose="02070309020205020404" pitchFamily="49" charset="0"/>
             </a:endParaRPr>
           </a:p>
           <a:p>
-            <a:endParaRPr lang="en-US" sz="2000" dirty="0"/>
+            <a:endParaRPr lang="en-US" sz="2000" dirty="0">
+              <a:solidFill>
+                <a:srgbClr val="3F115C"/>
+              </a:solidFill>
+            </a:endParaRPr>
           </a:p>
         </p:txBody>
       </p:sp>
@@ -20885,23 +21226,6 @@
 </file>
 
 <file path=customXml/item1.xml><?xml version="1.0" encoding="utf-8"?>
-<p:properties xmlns:p="http://schemas.microsoft.com/office/2006/metadata/properties" xmlns:xsi="http://www.w3.org/2001/XMLSchema-instance" xmlns:pc="http://schemas.microsoft.com/office/infopath/2007/PartnerControls">
-  <documentManagement>
-    <MediaServiceKeyPoints xmlns="61b79488-63fd-46f4-b1bf-09cb63d2085e" xsi:nil="true"/>
-  </documentManagement>
-</p:properties>
-</file>
-
-<file path=customXml/item2.xml><?xml version="1.0" encoding="utf-8"?>
-<?mso-contentType ?>
-<FormTemplates xmlns="http://schemas.microsoft.com/sharepoint/v3/contenttype/forms">
-  <Display>DocumentLibraryForm</Display>
-  <Edit>DocumentLibraryForm</Edit>
-  <New>DocumentLibraryForm</New>
-</FormTemplates>
-</file>
-
-<file path=customXml/item3.xml><?xml version="1.0" encoding="utf-8"?>
 <ct:contentTypeSchema xmlns:ct="http://schemas.microsoft.com/office/2006/metadata/contentType" xmlns:ma="http://schemas.microsoft.com/office/2006/metadata/properties/metaAttributes" ct:_="" ma:_="" ma:contentTypeName="Document" ma:contentTypeID="0x010100F09820594E7B0041BAC4DECBBC892FF9" ma:contentTypeVersion="8" ma:contentTypeDescription="Create a new document." ma:contentTypeScope="" ma:versionID="a4814d1cc1d58eee3ea03778ca413c81">
   <xsd:schema xmlns:xsd="http://www.w3.org/2001/XMLSchema" xmlns:xs="http://www.w3.org/2001/XMLSchema" xmlns:p="http://schemas.microsoft.com/office/2006/metadata/properties" xmlns:ns2="61b79488-63fd-46f4-b1bf-09cb63d2085e" targetNamespace="http://schemas.microsoft.com/office/2006/metadata/properties" ma:root="true" ma:fieldsID="40fb5444c5ccb72d5b900b723022c04a" ns2:_="">
     <xsd:import namespace="61b79488-63fd-46f4-b1bf-09cb63d2085e"/>
@@ -21073,31 +21397,24 @@
 </ct:contentTypeSchema>
 </file>
 
-<file path=customXml/itemProps1.xml><?xml version="1.0" encoding="utf-8"?>
-<ds:datastoreItem xmlns:ds="http://schemas.openxmlformats.org/officeDocument/2006/customXml" ds:itemID="{56E9BD92-A245-451A-82D6-41724A6593BA}">
-  <ds:schemaRefs>
-    <ds:schemaRef ds:uri="http://purl.org/dc/elements/1.1/"/>
-    <ds:schemaRef ds:uri="http://schemas.microsoft.com/office/2006/documentManagement/types"/>
-    <ds:schemaRef ds:uri="http://purl.org/dc/dcmitype/"/>
-    <ds:schemaRef ds:uri="http://schemas.microsoft.com/office/infopath/2007/PartnerControls"/>
-    <ds:schemaRef ds:uri="http://schemas.openxmlformats.org/package/2006/metadata/core-properties"/>
-    <ds:schemaRef ds:uri="http://purl.org/dc/terms/"/>
-    <ds:schemaRef ds:uri="http://schemas.microsoft.com/office/2006/metadata/properties"/>
-    <ds:schemaRef ds:uri="http://www.w3.org/XML/1998/namespace"/>
-    <ds:schemaRef ds:uri="61b79488-63fd-46f4-b1bf-09cb63d2085e"/>
-  </ds:schemaRefs>
-</ds:datastoreItem>
+<file path=customXml/item2.xml><?xml version="1.0" encoding="utf-8"?>
+<?mso-contentType ?>
+<FormTemplates xmlns="http://schemas.microsoft.com/sharepoint/v3/contenttype/forms">
+  <Display>DocumentLibraryForm</Display>
+  <Edit>DocumentLibraryForm</Edit>
+  <New>DocumentLibraryForm</New>
+</FormTemplates>
 </file>
 
-<file path=customXml/itemProps2.xml><?xml version="1.0" encoding="utf-8"?>
-<ds:datastoreItem xmlns:ds="http://schemas.openxmlformats.org/officeDocument/2006/customXml" ds:itemID="{4875BE8C-CB08-400E-A21F-2497FF16C77B}">
-  <ds:schemaRefs>
-    <ds:schemaRef ds:uri="http://schemas.microsoft.com/sharepoint/v3/contenttype/forms"/>
-  </ds:schemaRefs>
-</ds:datastoreItem>
+<file path=customXml/item3.xml><?xml version="1.0" encoding="utf-8"?>
+<p:properties xmlns:p="http://schemas.microsoft.com/office/2006/metadata/properties" xmlns:xsi="http://www.w3.org/2001/XMLSchema-instance" xmlns:pc="http://schemas.microsoft.com/office/infopath/2007/PartnerControls">
+  <documentManagement>
+    <MediaServiceKeyPoints xmlns="61b79488-63fd-46f4-b1bf-09cb63d2085e" xsi:nil="true"/>
+  </documentManagement>
+</p:properties>
 </file>
 
-<file path=customXml/itemProps3.xml><?xml version="1.0" encoding="utf-8"?>
+<file path=customXml/itemProps1.xml><?xml version="1.0" encoding="utf-8"?>
 <ds:datastoreItem xmlns:ds="http://schemas.openxmlformats.org/officeDocument/2006/customXml" ds:itemID="{535C360C-FC5A-43F7-BF1D-FA69DEF501D3}">
   <ds:schemaRefs>
     <ds:schemaRef ds:uri="http://schemas.microsoft.com/office/2006/metadata/contentType"/>
@@ -21115,6 +21432,30 @@
 </ds:datastoreItem>
 </file>
 
+<file path=customXml/itemProps2.xml><?xml version="1.0" encoding="utf-8"?>
+<ds:datastoreItem xmlns:ds="http://schemas.openxmlformats.org/officeDocument/2006/customXml" ds:itemID="{4875BE8C-CB08-400E-A21F-2497FF16C77B}">
+  <ds:schemaRefs>
+    <ds:schemaRef ds:uri="http://schemas.microsoft.com/sharepoint/v3/contenttype/forms"/>
+  </ds:schemaRefs>
+</ds:datastoreItem>
+</file>
+
+<file path=customXml/itemProps3.xml><?xml version="1.0" encoding="utf-8"?>
+<ds:datastoreItem xmlns:ds="http://schemas.openxmlformats.org/officeDocument/2006/customXml" ds:itemID="{56E9BD92-A245-451A-82D6-41724A6593BA}">
+  <ds:schemaRefs>
+    <ds:schemaRef ds:uri="http://purl.org/dc/elements/1.1/"/>
+    <ds:schemaRef ds:uri="http://schemas.microsoft.com/office/2006/documentManagement/types"/>
+    <ds:schemaRef ds:uri="http://purl.org/dc/dcmitype/"/>
+    <ds:schemaRef ds:uri="http://schemas.microsoft.com/office/infopath/2007/PartnerControls"/>
+    <ds:schemaRef ds:uri="http://schemas.openxmlformats.org/package/2006/metadata/core-properties"/>
+    <ds:schemaRef ds:uri="http://purl.org/dc/terms/"/>
+    <ds:schemaRef ds:uri="http://schemas.microsoft.com/office/2006/metadata/properties"/>
+    <ds:schemaRef ds:uri="http://www.w3.org/XML/1998/namespace"/>
+    <ds:schemaRef ds:uri="61b79488-63fd-46f4-b1bf-09cb63d2085e"/>
+  </ds:schemaRefs>
+</ds:datastoreItem>
+</file>
+
 <file path=docMetadata/LabelInfo.xml><?xml version="1.0" encoding="utf-8"?>
 <clbl:labelList xmlns:clbl="http://schemas.microsoft.com/office/2020/mipLabelMetadata">
   <clbl:label id="{f42aa342-8706-4288-bd11-ebb85995028c}" enabled="1" method="Standard" siteId="{72f988bf-86f1-41af-91ab-2d7cd011db47}" removed="0"/>

</xml_diff>

<commit_message>
FY23Q3 refresh - msteams-teamwork-endpoint
- run through all exercise steps in associated MSLearn module to validate good working order
- updated steps & fixed typos where necessary
- updated slides where necessary
- update code samples to reflect MSLearn HOL exercise refresh & updates
- any & all users/names/company names/pictures/IDs are not real people/tenants... all are from M365 demo tenants provided by Microsoft
</commit_message>
<xml_diff>
--- a/Teams/70 Microsoft Graph Teamwork Endpoint/slides.pptx
+++ b/Teams/70 Microsoft Graph Teamwork Endpoint/slides.pptx
@@ -1797,7 +1797,7 @@
         <a:p>
           <a:r>
             <a:rPr lang="en-US" dirty="0"/>
-            <a:t>Notify a user in chat</a:t>
+            <a:t>notify a user in chat</a:t>
           </a:r>
         </a:p>
       </dgm:t>
@@ -2650,7 +2650,7 @@
           </a:pPr>
           <a:r>
             <a:rPr lang="en-US" sz="3200" kern="1200" dirty="0"/>
-            <a:t>Notify a user in chat</a:t>
+            <a:t>notify a user in chat</a:t>
           </a:r>
         </a:p>
       </dsp:txBody>
@@ -5966,7 +5966,7 @@
           <a:p>
             <a:fld id="{F5D67128-0ED3-F84C-AB75-26956BD6F773}" type="datetimeFigureOut">
               <a:rPr lang="en-US" smtClean="0"/>
-              <a:t>12/4/22</a:t>
+              <a:t>12/13/22</a:t>
             </a:fld>
             <a:endParaRPr lang="en-US"/>
           </a:p>
@@ -6143,7 +6143,7 @@
           <a:p>
             <a:fld id="{9E65F564-29A8-0243-B41B-CCCF740F82F1}" type="datetimeFigureOut">
               <a:rPr lang="en-US" smtClean="0"/>
-              <a:t>12/4/22</a:t>
+              <a:t>12/13/22</a:t>
             </a:fld>
             <a:endParaRPr lang="en-US"/>
           </a:p>
@@ -17387,6 +17387,11 @@
           </p:cNvGraphicFramePr>
           <p:nvPr>
             <p:ph idx="1"/>
+            <p:extLst>
+              <p:ext uri="{D42A27DB-BD31-4B8C-83A1-F6EECF244321}">
+                <p14:modId xmlns:p14="http://schemas.microsoft.com/office/powerpoint/2010/main" val="3168096201"/>
+              </p:ext>
+            </p:extLst>
           </p:nvPr>
         </p:nvGraphicFramePr>
         <p:xfrm>
@@ -18310,7 +18315,7 @@
                 <a:latin typeface="Courier New" panose="02070309020205020404" pitchFamily="49" charset="0"/>
                 <a:cs typeface="Courier New" panose="02070309020205020404" pitchFamily="49" charset="0"/>
               </a:rPr>
-              <a:t>/beta/teams/{</a:t>
+              <a:t>/v1.0/teams/{</a:t>
             </a:r>
             <a:r>
               <a:rPr lang="en-US" sz="1200" dirty="0" err="1">
@@ -19643,6 +19648,9 @@
             </a:pPr>
             <a:r>
               <a:rPr lang="en-US" dirty="0">
+                <a:solidFill>
+                  <a:srgbClr val="3F115C"/>
+                </a:solidFill>
                 <a:latin typeface="Courier New" panose="02070309020205020404" pitchFamily="49" charset="0"/>
                 <a:cs typeface="Courier New" panose="02070309020205020404" pitchFamily="49" charset="0"/>
               </a:rPr>
@@ -19650,6 +19658,9 @@
             </a:r>
             <a:r>
               <a:rPr lang="en-US" dirty="0" err="1">
+                <a:solidFill>
+                  <a:srgbClr val="3F115C"/>
+                </a:solidFill>
                 <a:latin typeface="Courier New" panose="02070309020205020404" pitchFamily="49" charset="0"/>
                 <a:cs typeface="Courier New" panose="02070309020205020404" pitchFamily="49" charset="0"/>
               </a:rPr>
@@ -19657,6 +19668,9 @@
             </a:r>
             <a:r>
               <a:rPr lang="en-US" dirty="0">
+                <a:solidFill>
+                  <a:srgbClr val="3F115C"/>
+                </a:solidFill>
                 <a:latin typeface="Courier New" panose="02070309020205020404" pitchFamily="49" charset="0"/>
                 <a:cs typeface="Courier New" panose="02070309020205020404" pitchFamily="49" charset="0"/>
               </a:rPr>
@@ -19669,6 +19683,9 @@
             </a:pPr>
             <a:r>
               <a:rPr lang="en-US" dirty="0">
+                <a:solidFill>
+                  <a:srgbClr val="3F115C"/>
+                </a:solidFill>
                 <a:latin typeface="Courier New" panose="02070309020205020404" pitchFamily="49" charset="0"/>
                 <a:cs typeface="Courier New" panose="02070309020205020404" pitchFamily="49" charset="0"/>
               </a:rPr>
@@ -19681,6 +19698,9 @@
             </a:pPr>
             <a:r>
               <a:rPr lang="en-US" dirty="0">
+                <a:solidFill>
+                  <a:srgbClr val="3F115C"/>
+                </a:solidFill>
                 <a:latin typeface="Courier New" panose="02070309020205020404" pitchFamily="49" charset="0"/>
                 <a:cs typeface="Courier New" panose="02070309020205020404" pitchFamily="49" charset="0"/>
               </a:rPr>
@@ -19688,6 +19708,9 @@
             </a:r>
             <a:r>
               <a:rPr lang="en-US" dirty="0" err="1">
+                <a:solidFill>
+                  <a:srgbClr val="3F115C"/>
+                </a:solidFill>
                 <a:latin typeface="Courier New" panose="02070309020205020404" pitchFamily="49" charset="0"/>
                 <a:cs typeface="Courier New" panose="02070309020205020404" pitchFamily="49" charset="0"/>
               </a:rPr>
@@ -19695,6 +19718,9 @@
             </a:r>
             <a:r>
               <a:rPr lang="en-US" dirty="0">
+                <a:solidFill>
+                  <a:srgbClr val="3F115C"/>
+                </a:solidFill>
                 <a:latin typeface="Courier New" panose="02070309020205020404" pitchFamily="49" charset="0"/>
                 <a:cs typeface="Courier New" panose="02070309020205020404" pitchFamily="49" charset="0"/>
               </a:rPr>
@@ -19707,6 +19733,9 @@
             </a:pPr>
             <a:r>
               <a:rPr lang="en-US" dirty="0">
+                <a:solidFill>
+                  <a:srgbClr val="3F115C"/>
+                </a:solidFill>
                 <a:latin typeface="Courier New" panose="02070309020205020404" pitchFamily="49" charset="0"/>
                 <a:cs typeface="Courier New" panose="02070309020205020404" pitchFamily="49" charset="0"/>
               </a:rPr>
@@ -19714,6 +19743,9 @@
             </a:r>
             <a:r>
               <a:rPr lang="en-US" dirty="0" err="1">
+                <a:solidFill>
+                  <a:srgbClr val="3F115C"/>
+                </a:solidFill>
                 <a:latin typeface="Courier New" panose="02070309020205020404" pitchFamily="49" charset="0"/>
                 <a:cs typeface="Courier New" panose="02070309020205020404" pitchFamily="49" charset="0"/>
               </a:rPr>
@@ -19721,6 +19753,9 @@
             </a:r>
             <a:r>
               <a:rPr lang="en-US" dirty="0">
+                <a:solidFill>
+                  <a:srgbClr val="3F115C"/>
+                </a:solidFill>
                 <a:latin typeface="Courier New" panose="02070309020205020404" pitchFamily="49" charset="0"/>
                 <a:cs typeface="Courier New" panose="02070309020205020404" pitchFamily="49" charset="0"/>
               </a:rPr>
@@ -19733,6 +19768,9 @@
             </a:pPr>
             <a:r>
               <a:rPr lang="en-US" dirty="0">
+                <a:solidFill>
+                  <a:srgbClr val="3F115C"/>
+                </a:solidFill>
                 <a:latin typeface="Courier New" panose="02070309020205020404" pitchFamily="49" charset="0"/>
                 <a:cs typeface="Courier New" panose="02070309020205020404" pitchFamily="49" charset="0"/>
               </a:rPr>
@@ -19740,6 +19778,9 @@
             </a:r>
             <a:r>
               <a:rPr lang="en-US" dirty="0" err="1">
+                <a:solidFill>
+                  <a:srgbClr val="3F115C"/>
+                </a:solidFill>
                 <a:latin typeface="Courier New" panose="02070309020205020404" pitchFamily="49" charset="0"/>
                 <a:cs typeface="Courier New" panose="02070309020205020404" pitchFamily="49" charset="0"/>
               </a:rPr>
@@ -19747,6 +19788,9 @@
             </a:r>
             <a:r>
               <a:rPr lang="en-US" dirty="0">
+                <a:solidFill>
+                  <a:srgbClr val="3F115C"/>
+                </a:solidFill>
                 <a:latin typeface="Courier New" panose="02070309020205020404" pitchFamily="49" charset="0"/>
                 <a:cs typeface="Courier New" panose="02070309020205020404" pitchFamily="49" charset="0"/>
               </a:rPr>
@@ -19849,6 +19893,9 @@
             </a:pPr>
             <a:r>
               <a:rPr lang="en-US" dirty="0">
+                <a:solidFill>
+                  <a:srgbClr val="3F115C"/>
+                </a:solidFill>
                 <a:latin typeface="Courier New" panose="02070309020205020404" pitchFamily="49" charset="0"/>
                 <a:cs typeface="Courier New" panose="02070309020205020404" pitchFamily="49" charset="0"/>
               </a:rPr>
@@ -19856,6 +19903,9 @@
             </a:r>
             <a:r>
               <a:rPr lang="en-US" dirty="0" err="1">
+                <a:solidFill>
+                  <a:srgbClr val="3F115C"/>
+                </a:solidFill>
                 <a:latin typeface="Courier New" panose="02070309020205020404" pitchFamily="49" charset="0"/>
                 <a:cs typeface="Courier New" panose="02070309020205020404" pitchFamily="49" charset="0"/>
               </a:rPr>
@@ -19863,6 +19913,9 @@
             </a:r>
             <a:r>
               <a:rPr lang="en-US" dirty="0">
+                <a:solidFill>
+                  <a:srgbClr val="3F115C"/>
+                </a:solidFill>
                 <a:latin typeface="Courier New" panose="02070309020205020404" pitchFamily="49" charset="0"/>
                 <a:cs typeface="Courier New" panose="02070309020205020404" pitchFamily="49" charset="0"/>
               </a:rPr>
@@ -19875,6 +19928,9 @@
             </a:pPr>
             <a:r>
               <a:rPr lang="en-US" dirty="0">
+                <a:solidFill>
+                  <a:srgbClr val="3F115C"/>
+                </a:solidFill>
                 <a:latin typeface="Courier New" panose="02070309020205020404" pitchFamily="49" charset="0"/>
                 <a:cs typeface="Courier New" panose="02070309020205020404" pitchFamily="49" charset="0"/>
               </a:rPr>
@@ -19882,6 +19938,9 @@
             </a:r>
             <a:r>
               <a:rPr lang="en-US" dirty="0" err="1">
+                <a:solidFill>
+                  <a:srgbClr val="3F115C"/>
+                </a:solidFill>
                 <a:latin typeface="Courier New" panose="02070309020205020404" pitchFamily="49" charset="0"/>
                 <a:cs typeface="Courier New" panose="02070309020205020404" pitchFamily="49" charset="0"/>
               </a:rPr>
@@ -19889,6 +19948,9 @@
             </a:r>
             <a:r>
               <a:rPr lang="en-US" dirty="0">
+                <a:solidFill>
+                  <a:srgbClr val="3F115C"/>
+                </a:solidFill>
                 <a:latin typeface="Courier New" panose="02070309020205020404" pitchFamily="49" charset="0"/>
                 <a:cs typeface="Courier New" panose="02070309020205020404" pitchFamily="49" charset="0"/>
               </a:rPr>
@@ -19901,6 +19963,9 @@
             </a:pPr>
             <a:r>
               <a:rPr lang="en-US" dirty="0">
+                <a:solidFill>
+                  <a:srgbClr val="3F115C"/>
+                </a:solidFill>
                 <a:latin typeface="Courier New" panose="02070309020205020404" pitchFamily="49" charset="0"/>
                 <a:cs typeface="Courier New" panose="02070309020205020404" pitchFamily="49" charset="0"/>
               </a:rPr>
@@ -19908,6 +19973,9 @@
             </a:r>
             <a:r>
               <a:rPr lang="en-US" dirty="0" err="1">
+                <a:solidFill>
+                  <a:srgbClr val="3F115C"/>
+                </a:solidFill>
                 <a:latin typeface="Courier New" panose="02070309020205020404" pitchFamily="49" charset="0"/>
                 <a:cs typeface="Courier New" panose="02070309020205020404" pitchFamily="49" charset="0"/>
               </a:rPr>
@@ -19915,6 +19983,9 @@
             </a:r>
             <a:r>
               <a:rPr lang="en-US" dirty="0">
+                <a:solidFill>
+                  <a:srgbClr val="3F115C"/>
+                </a:solidFill>
                 <a:latin typeface="Courier New" panose="02070309020205020404" pitchFamily="49" charset="0"/>
                 <a:cs typeface="Courier New" panose="02070309020205020404" pitchFamily="49" charset="0"/>
               </a:rPr>
@@ -19927,6 +19998,9 @@
             </a:pPr>
             <a:r>
               <a:rPr lang="en-US" dirty="0">
+                <a:solidFill>
+                  <a:srgbClr val="3F115C"/>
+                </a:solidFill>
                 <a:latin typeface="Courier New" panose="02070309020205020404" pitchFamily="49" charset="0"/>
                 <a:cs typeface="Courier New" panose="02070309020205020404" pitchFamily="49" charset="0"/>
               </a:rPr>
@@ -19939,6 +20013,9 @@
             </a:pPr>
             <a:r>
               <a:rPr lang="en-US" dirty="0">
+                <a:solidFill>
+                  <a:srgbClr val="3F115C"/>
+                </a:solidFill>
                 <a:latin typeface="Courier New" panose="02070309020205020404" pitchFamily="49" charset="0"/>
                 <a:cs typeface="Courier New" panose="02070309020205020404" pitchFamily="49" charset="0"/>
               </a:rPr>
@@ -19946,6 +20023,9 @@
             </a:r>
             <a:r>
               <a:rPr lang="en-US" dirty="0" err="1">
+                <a:solidFill>
+                  <a:srgbClr val="3F115C"/>
+                </a:solidFill>
                 <a:latin typeface="Courier New" panose="02070309020205020404" pitchFamily="49" charset="0"/>
                 <a:cs typeface="Courier New" panose="02070309020205020404" pitchFamily="49" charset="0"/>
               </a:rPr>
@@ -19953,6 +20033,9 @@
             </a:r>
             <a:r>
               <a:rPr lang="en-US" dirty="0">
+                <a:solidFill>
+                  <a:srgbClr val="3F115C"/>
+                </a:solidFill>
                 <a:latin typeface="Courier New" panose="02070309020205020404" pitchFamily="49" charset="0"/>
                 <a:cs typeface="Courier New" panose="02070309020205020404" pitchFamily="49" charset="0"/>
               </a:rPr>
@@ -19965,6 +20048,9 @@
             </a:pPr>
             <a:r>
               <a:rPr lang="en-US" dirty="0">
+                <a:solidFill>
+                  <a:srgbClr val="3F115C"/>
+                </a:solidFill>
                 <a:latin typeface="Courier New" panose="02070309020205020404" pitchFamily="49" charset="0"/>
                 <a:cs typeface="Courier New" panose="02070309020205020404" pitchFamily="49" charset="0"/>
               </a:rPr>
@@ -19972,6 +20058,9 @@
             </a:r>
             <a:r>
               <a:rPr lang="en-US" dirty="0" err="1">
+                <a:solidFill>
+                  <a:srgbClr val="3F115C"/>
+                </a:solidFill>
                 <a:latin typeface="Courier New" panose="02070309020205020404" pitchFamily="49" charset="0"/>
                 <a:cs typeface="Courier New" panose="02070309020205020404" pitchFamily="49" charset="0"/>
               </a:rPr>
@@ -19979,6 +20068,9 @@
             </a:r>
             <a:r>
               <a:rPr lang="en-US" dirty="0">
+                <a:solidFill>
+                  <a:srgbClr val="3F115C"/>
+                </a:solidFill>
                 <a:latin typeface="Courier New" panose="02070309020205020404" pitchFamily="49" charset="0"/>
                 <a:cs typeface="Courier New" panose="02070309020205020404" pitchFamily="49" charset="0"/>
               </a:rPr>
@@ -19991,6 +20083,9 @@
             </a:pPr>
             <a:r>
               <a:rPr lang="en-US" dirty="0">
+                <a:solidFill>
+                  <a:srgbClr val="3F115C"/>
+                </a:solidFill>
                 <a:latin typeface="Courier New" panose="02070309020205020404" pitchFamily="49" charset="0"/>
                 <a:cs typeface="Courier New" panose="02070309020205020404" pitchFamily="49" charset="0"/>
               </a:rPr>
@@ -20003,6 +20098,9 @@
             </a:pPr>
             <a:r>
               <a:rPr lang="en-US" dirty="0">
+                <a:solidFill>
+                  <a:srgbClr val="3F115C"/>
+                </a:solidFill>
                 <a:latin typeface="Courier New" panose="02070309020205020404" pitchFamily="49" charset="0"/>
                 <a:cs typeface="Courier New" panose="02070309020205020404" pitchFamily="49" charset="0"/>
               </a:rPr>
@@ -20014,12 +20112,19 @@
               <a:buNone/>
             </a:pPr>
             <a:endParaRPr lang="en-US" dirty="0">
+              <a:solidFill>
+                <a:srgbClr val="3F115C"/>
+              </a:solidFill>
               <a:latin typeface="Courier New" panose="02070309020205020404" pitchFamily="49" charset="0"/>
               <a:cs typeface="Courier New" panose="02070309020205020404" pitchFamily="49" charset="0"/>
             </a:endParaRPr>
           </a:p>
           <a:p>
-            <a:endParaRPr lang="en-US" dirty="0"/>
+            <a:endParaRPr lang="en-US" dirty="0">
+              <a:solidFill>
+                <a:srgbClr val="3F115C"/>
+              </a:solidFill>
+            </a:endParaRPr>
           </a:p>
         </p:txBody>
       </p:sp>
@@ -21226,6 +21331,23 @@
 </file>
 
 <file path=customXml/item1.xml><?xml version="1.0" encoding="utf-8"?>
+<?mso-contentType ?>
+<FormTemplates xmlns="http://schemas.microsoft.com/sharepoint/v3/contenttype/forms">
+  <Display>DocumentLibraryForm</Display>
+  <Edit>DocumentLibraryForm</Edit>
+  <New>DocumentLibraryForm</New>
+</FormTemplates>
+</file>
+
+<file path=customXml/item2.xml><?xml version="1.0" encoding="utf-8"?>
+<p:properties xmlns:p="http://schemas.microsoft.com/office/2006/metadata/properties" xmlns:xsi="http://www.w3.org/2001/XMLSchema-instance" xmlns:pc="http://schemas.microsoft.com/office/infopath/2007/PartnerControls">
+  <documentManagement>
+    <MediaServiceKeyPoints xmlns="61b79488-63fd-46f4-b1bf-09cb63d2085e" xsi:nil="true"/>
+  </documentManagement>
+</p:properties>
+</file>
+
+<file path=customXml/item3.xml><?xml version="1.0" encoding="utf-8"?>
 <ct:contentTypeSchema xmlns:ct="http://schemas.microsoft.com/office/2006/metadata/contentType" xmlns:ma="http://schemas.microsoft.com/office/2006/metadata/properties/metaAttributes" ct:_="" ma:_="" ma:contentTypeName="Document" ma:contentTypeID="0x010100F09820594E7B0041BAC4DECBBC892FF9" ma:contentTypeVersion="8" ma:contentTypeDescription="Create a new document." ma:contentTypeScope="" ma:versionID="a4814d1cc1d58eee3ea03778ca413c81">
   <xsd:schema xmlns:xsd="http://www.w3.org/2001/XMLSchema" xmlns:xs="http://www.w3.org/2001/XMLSchema" xmlns:p="http://schemas.microsoft.com/office/2006/metadata/properties" xmlns:ns2="61b79488-63fd-46f4-b1bf-09cb63d2085e" targetNamespace="http://schemas.microsoft.com/office/2006/metadata/properties" ma:root="true" ma:fieldsID="40fb5444c5ccb72d5b900b723022c04a" ns2:_="">
     <xsd:import namespace="61b79488-63fd-46f4-b1bf-09cb63d2085e"/>
@@ -21397,24 +21519,31 @@
 </ct:contentTypeSchema>
 </file>
 
-<file path=customXml/item2.xml><?xml version="1.0" encoding="utf-8"?>
-<?mso-contentType ?>
-<FormTemplates xmlns="http://schemas.microsoft.com/sharepoint/v3/contenttype/forms">
-  <Display>DocumentLibraryForm</Display>
-  <Edit>DocumentLibraryForm</Edit>
-  <New>DocumentLibraryForm</New>
-</FormTemplates>
+<file path=customXml/itemProps1.xml><?xml version="1.0" encoding="utf-8"?>
+<ds:datastoreItem xmlns:ds="http://schemas.openxmlformats.org/officeDocument/2006/customXml" ds:itemID="{4875BE8C-CB08-400E-A21F-2497FF16C77B}">
+  <ds:schemaRefs>
+    <ds:schemaRef ds:uri="http://schemas.microsoft.com/sharepoint/v3/contenttype/forms"/>
+  </ds:schemaRefs>
+</ds:datastoreItem>
 </file>
 
-<file path=customXml/item3.xml><?xml version="1.0" encoding="utf-8"?>
-<p:properties xmlns:p="http://schemas.microsoft.com/office/2006/metadata/properties" xmlns:xsi="http://www.w3.org/2001/XMLSchema-instance" xmlns:pc="http://schemas.microsoft.com/office/infopath/2007/PartnerControls">
-  <documentManagement>
-    <MediaServiceKeyPoints xmlns="61b79488-63fd-46f4-b1bf-09cb63d2085e" xsi:nil="true"/>
-  </documentManagement>
-</p:properties>
+<file path=customXml/itemProps2.xml><?xml version="1.0" encoding="utf-8"?>
+<ds:datastoreItem xmlns:ds="http://schemas.openxmlformats.org/officeDocument/2006/customXml" ds:itemID="{56E9BD92-A245-451A-82D6-41724A6593BA}">
+  <ds:schemaRefs>
+    <ds:schemaRef ds:uri="http://purl.org/dc/elements/1.1/"/>
+    <ds:schemaRef ds:uri="http://schemas.microsoft.com/office/2006/documentManagement/types"/>
+    <ds:schemaRef ds:uri="http://purl.org/dc/dcmitype/"/>
+    <ds:schemaRef ds:uri="http://schemas.microsoft.com/office/infopath/2007/PartnerControls"/>
+    <ds:schemaRef ds:uri="http://schemas.openxmlformats.org/package/2006/metadata/core-properties"/>
+    <ds:schemaRef ds:uri="http://purl.org/dc/terms/"/>
+    <ds:schemaRef ds:uri="http://schemas.microsoft.com/office/2006/metadata/properties"/>
+    <ds:schemaRef ds:uri="http://www.w3.org/XML/1998/namespace"/>
+    <ds:schemaRef ds:uri="61b79488-63fd-46f4-b1bf-09cb63d2085e"/>
+  </ds:schemaRefs>
+</ds:datastoreItem>
 </file>
 
-<file path=customXml/itemProps1.xml><?xml version="1.0" encoding="utf-8"?>
+<file path=customXml/itemProps3.xml><?xml version="1.0" encoding="utf-8"?>
 <ds:datastoreItem xmlns:ds="http://schemas.openxmlformats.org/officeDocument/2006/customXml" ds:itemID="{535C360C-FC5A-43F7-BF1D-FA69DEF501D3}">
   <ds:schemaRefs>
     <ds:schemaRef ds:uri="http://schemas.microsoft.com/office/2006/metadata/contentType"/>
@@ -21432,30 +21561,6 @@
 </ds:datastoreItem>
 </file>
 
-<file path=customXml/itemProps2.xml><?xml version="1.0" encoding="utf-8"?>
-<ds:datastoreItem xmlns:ds="http://schemas.openxmlformats.org/officeDocument/2006/customXml" ds:itemID="{4875BE8C-CB08-400E-A21F-2497FF16C77B}">
-  <ds:schemaRefs>
-    <ds:schemaRef ds:uri="http://schemas.microsoft.com/sharepoint/v3/contenttype/forms"/>
-  </ds:schemaRefs>
-</ds:datastoreItem>
-</file>
-
-<file path=customXml/itemProps3.xml><?xml version="1.0" encoding="utf-8"?>
-<ds:datastoreItem xmlns:ds="http://schemas.openxmlformats.org/officeDocument/2006/customXml" ds:itemID="{56E9BD92-A245-451A-82D6-41724A6593BA}">
-  <ds:schemaRefs>
-    <ds:schemaRef ds:uri="http://purl.org/dc/elements/1.1/"/>
-    <ds:schemaRef ds:uri="http://schemas.microsoft.com/office/2006/documentManagement/types"/>
-    <ds:schemaRef ds:uri="http://purl.org/dc/dcmitype/"/>
-    <ds:schemaRef ds:uri="http://schemas.microsoft.com/office/infopath/2007/PartnerControls"/>
-    <ds:schemaRef ds:uri="http://schemas.openxmlformats.org/package/2006/metadata/core-properties"/>
-    <ds:schemaRef ds:uri="http://purl.org/dc/terms/"/>
-    <ds:schemaRef ds:uri="http://schemas.microsoft.com/office/2006/metadata/properties"/>
-    <ds:schemaRef ds:uri="http://www.w3.org/XML/1998/namespace"/>
-    <ds:schemaRef ds:uri="61b79488-63fd-46f4-b1bf-09cb63d2085e"/>
-  </ds:schemaRefs>
-</ds:datastoreItem>
-</file>
-
 <file path=docMetadata/LabelInfo.xml><?xml version="1.0" encoding="utf-8"?>
 <clbl:labelList xmlns:clbl="http://schemas.microsoft.com/office/2020/mipLabelMetadata">
   <clbl:label id="{f42aa342-8706-4288-bd11-ebb85995028c}" enabled="1" method="Standard" siteId="{72f988bf-86f1-41af-91ab-2d7cd011db47}" removed="0"/>

</xml_diff>